<commit_message>
Update authentication in JWT, standard response, CRUD, authorization and file uploading
</commit_message>
<xml_diff>
--- a/eat-cook-repeat/EAT, COOK, REPEAT.pptx
+++ b/eat-cook-repeat/EAT, COOK, REPEAT.pptx
@@ -13,9 +13,8 @@
     <p:sldId id="261" r:id="rId7"/>
     <p:sldId id="262" r:id="rId8"/>
     <p:sldId id="263" r:id="rId9"/>
-    <p:sldId id="264" r:id="rId10"/>
-    <p:sldId id="265" r:id="rId11"/>
-    <p:sldId id="266" r:id="rId12"/>
+    <p:sldId id="265" r:id="rId10"/>
+    <p:sldId id="266" r:id="rId11"/>
   </p:sldIdLst>
   <p:sldSz cx="9144000" cy="6858000" type="screen4x3"/>
   <p:notesSz cx="6858000" cy="9144000"/>
@@ -2874,7 +2873,7 @@
           <a:p>
             <a:fld id="{D4FF8C98-F944-4A05-9C25-99505F4B14BA}" type="datetimeFigureOut">
               <a:rPr lang="en-US" smtClean="0"/>
-              <a:t>3/28/2022</a:t>
+              <a:t>4/4/2022</a:t>
             </a:fld>
             <a:endParaRPr lang="en-US"/>
           </a:p>
@@ -3159,7 +3158,7 @@
           <a:p>
             <a:fld id="{D4FF8C98-F944-4A05-9C25-99505F4B14BA}" type="datetimeFigureOut">
               <a:rPr lang="en-US" smtClean="0"/>
-              <a:t>3/28/2022</a:t>
+              <a:t>4/4/2022</a:t>
             </a:fld>
             <a:endParaRPr lang="en-US"/>
           </a:p>
@@ -3334,7 +3333,7 @@
           <a:p>
             <a:fld id="{D4FF8C98-F944-4A05-9C25-99505F4B14BA}" type="datetimeFigureOut">
               <a:rPr lang="en-US" smtClean="0"/>
-              <a:t>3/28/2022</a:t>
+              <a:t>4/4/2022</a:t>
             </a:fld>
             <a:endParaRPr lang="en-US"/>
           </a:p>
@@ -3499,7 +3498,7 @@
           <a:p>
             <a:fld id="{D4FF8C98-F944-4A05-9C25-99505F4B14BA}" type="datetimeFigureOut">
               <a:rPr lang="en-US" smtClean="0"/>
-              <a:t>3/28/2022</a:t>
+              <a:t>4/4/2022</a:t>
             </a:fld>
             <a:endParaRPr lang="en-US"/>
           </a:p>
@@ -3740,7 +3739,7 @@
           <a:p>
             <a:fld id="{D4FF8C98-F944-4A05-9C25-99505F4B14BA}" type="datetimeFigureOut">
               <a:rPr lang="en-US" smtClean="0"/>
-              <a:t>3/28/2022</a:t>
+              <a:t>4/4/2022</a:t>
             </a:fld>
             <a:endParaRPr lang="en-US"/>
           </a:p>
@@ -3853,7 +3852,7 @@
           <a:p>
             <a:fld id="{D4FF8C98-F944-4A05-9C25-99505F4B14BA}" type="datetimeFigureOut">
               <a:rPr lang="en-US" smtClean="0"/>
-              <a:t>3/28/2022</a:t>
+              <a:t>4/4/2022</a:t>
             </a:fld>
             <a:endParaRPr lang="en-US"/>
           </a:p>
@@ -4392,7 +4391,7 @@
           <a:p>
             <a:fld id="{D4FF8C98-F944-4A05-9C25-99505F4B14BA}" type="datetimeFigureOut">
               <a:rPr lang="en-US" smtClean="0"/>
-              <a:t>3/28/2022</a:t>
+              <a:t>4/4/2022</a:t>
             </a:fld>
             <a:endParaRPr lang="en-US"/>
           </a:p>
@@ -4505,7 +4504,7 @@
           <a:p>
             <a:fld id="{D4FF8C98-F944-4A05-9C25-99505F4B14BA}" type="datetimeFigureOut">
               <a:rPr lang="en-US" smtClean="0"/>
-              <a:t>3/28/2022</a:t>
+              <a:t>4/4/2022</a:t>
             </a:fld>
             <a:endParaRPr lang="en-US"/>
           </a:p>
@@ -4595,7 +4594,7 @@
           <a:p>
             <a:fld id="{D4FF8C98-F944-4A05-9C25-99505F4B14BA}" type="datetimeFigureOut">
               <a:rPr lang="en-US" smtClean="0"/>
-              <a:t>3/28/2022</a:t>
+              <a:t>4/4/2022</a:t>
             </a:fld>
             <a:endParaRPr lang="en-US"/>
           </a:p>
@@ -7246,7 +7245,7 @@
           <a:p>
             <a:fld id="{D4FF8C98-F944-4A05-9C25-99505F4B14BA}" type="datetimeFigureOut">
               <a:rPr lang="en-US" smtClean="0"/>
-              <a:t>3/28/2022</a:t>
+              <a:t>4/4/2022</a:t>
             </a:fld>
             <a:endParaRPr lang="en-US"/>
           </a:p>
@@ -10458,7 +10457,7 @@
           <a:p>
             <a:fld id="{D4FF8C98-F944-4A05-9C25-99505F4B14BA}" type="datetimeFigureOut">
               <a:rPr lang="en-US" smtClean="0"/>
-              <a:t>3/28/2022</a:t>
+              <a:t>4/4/2022</a:t>
             </a:fld>
             <a:endParaRPr lang="en-US"/>
           </a:p>
@@ -13280,7 +13279,7 @@
           <a:p>
             <a:fld id="{D4FF8C98-F944-4A05-9C25-99505F4B14BA}" type="datetimeFigureOut">
               <a:rPr lang="en-US" smtClean="0"/>
-              <a:t>3/28/2022</a:t>
+              <a:t>4/4/2022</a:t>
             </a:fld>
             <a:endParaRPr lang="en-US"/>
           </a:p>
@@ -13852,67 +13851,6 @@
         </p:nvSpPr>
         <p:spPr>
           <a:xfrm>
-            <a:off x="971600" y="3501008"/>
-            <a:ext cx="7024744" cy="638944"/>
-          </a:xfrm>
-        </p:spPr>
-        <p:txBody>
-          <a:bodyPr>
-            <a:noAutofit/>
-          </a:bodyPr>
-          <a:lstStyle/>
-          <a:p>
-            <a:pPr algn="ctr"/>
-            <a:r>
-              <a:rPr lang="en-US" sz="4800" dirty="0" smtClean="0"/>
-              <a:t>Any Question Before Closing?</a:t>
-            </a:r>
-            <a:endParaRPr lang="en-US" sz="4800" dirty="0"/>
-          </a:p>
-        </p:txBody>
-      </p:sp>
-    </p:spTree>
-    <p:extLst>
-      <p:ext uri="{BB962C8B-B14F-4D97-AF65-F5344CB8AC3E}">
-        <p14:creationId xmlns:p14="http://schemas.microsoft.com/office/powerpoint/2010/main" val="3075179201"/>
-      </p:ext>
-    </p:extLst>
-  </p:cSld>
-  <p:clrMapOvr>
-    <a:masterClrMapping/>
-  </p:clrMapOvr>
-</p:sld>
-</file>
-
-<file path=ppt/slides/slide11.xml><?xml version="1.0" encoding="utf-8"?>
-<p:sld xmlns:a="http://schemas.openxmlformats.org/drawingml/2006/main" xmlns:r="http://schemas.openxmlformats.org/officeDocument/2006/relationships" xmlns:p="http://schemas.openxmlformats.org/presentationml/2006/main">
-  <p:cSld>
-    <p:spTree>
-      <p:nvGrpSpPr>
-        <p:cNvPr id="1" name=""/>
-        <p:cNvGrpSpPr/>
-        <p:nvPr/>
-      </p:nvGrpSpPr>
-      <p:grpSpPr>
-        <a:xfrm>
-          <a:off x="0" y="0"/>
-          <a:ext cx="0" cy="0"/>
-          <a:chOff x="0" y="0"/>
-          <a:chExt cx="0" cy="0"/>
-        </a:xfrm>
-      </p:grpSpPr>
-      <p:sp>
-        <p:nvSpPr>
-          <p:cNvPr id="2" name="Title 1"/>
-          <p:cNvSpPr>
-            <a:spLocks noGrp="1"/>
-          </p:cNvSpPr>
-          <p:nvPr>
-            <p:ph type="title"/>
-          </p:nvPr>
-        </p:nvSpPr>
-        <p:spPr>
-          <a:xfrm>
             <a:off x="971600" y="3068960"/>
             <a:ext cx="7024744" cy="638944"/>
           </a:xfrm>
@@ -14020,11 +13958,7 @@
             <a:pPr algn="just"/>
             <a:r>
               <a:rPr lang="en-US" sz="2800" dirty="0" smtClean="0"/>
-              <a:t>Design</a:t>
-            </a:r>
-            <a:r>
-              <a:rPr lang="en-US" sz="2800" dirty="0" smtClean="0"/>
-              <a:t>ing and developing the backend for Eat, Cook, Repeat recipe application</a:t>
+              <a:t>Designing and developing the backend for Eat, Cook, Repeat recipe application</a:t>
             </a:r>
           </a:p>
           <a:p>
@@ -14095,33 +14029,6 @@
           </a:p>
         </p:txBody>
       </p:sp>
-      <p:sp>
-        <p:nvSpPr>
-          <p:cNvPr id="3" name="Content Placeholder 2"/>
-          <p:cNvSpPr>
-            <a:spLocks noGrp="1"/>
-          </p:cNvSpPr>
-          <p:nvPr>
-            <p:ph idx="1"/>
-          </p:nvPr>
-        </p:nvSpPr>
-        <p:spPr>
-          <a:xfrm>
-            <a:off x="1043493" y="2323652"/>
-            <a:ext cx="3384492" cy="3508977"/>
-          </a:xfrm>
-        </p:spPr>
-        <p:txBody>
-          <a:bodyPr>
-            <a:normAutofit/>
-          </a:bodyPr>
-          <a:lstStyle/>
-          <a:p>
-            <a:pPr algn="just"/>
-            <a:endParaRPr lang="en-US" dirty="0"/>
-          </a:p>
-        </p:txBody>
-      </p:sp>
       <p:pic>
         <p:nvPicPr>
           <p:cNvPr id="1026" name="Picture 2" descr="https://miro.medium.com/max/1051/1*q9myzo5Au8OfsaSrCodNmw.png"/>
@@ -14145,7 +14052,7 @@
         </p:blipFill>
         <p:spPr bwMode="auto">
           <a:xfrm>
-            <a:off x="603633" y="1700808"/>
+            <a:off x="589952" y="1882536"/>
             <a:ext cx="2232247" cy="1335950"/>
           </a:xfrm>
           <a:prstGeom prst="rect">
@@ -14172,7 +14079,7 @@
           <p:nvPr/>
         </p:nvPicPr>
         <p:blipFill>
-          <a:blip r:embed="rId3">
+          <a:blip r:embed="rId3" cstate="print">
             <a:extLst>
               <a:ext uri="{28A0092B-C50C-407E-A947-70E740481C1C}">
                 <a14:useLocalDpi xmlns:a14="http://schemas.microsoft.com/office/drawing/2010/main" val="0"/>
@@ -14186,8 +14093,8 @@
         </p:blipFill>
         <p:spPr bwMode="auto">
           <a:xfrm>
-            <a:off x="1586841" y="4005064"/>
-            <a:ext cx="5512985" cy="2304256"/>
+            <a:off x="755576" y="5139073"/>
+            <a:ext cx="3101054" cy="1296144"/>
           </a:xfrm>
           <a:prstGeom prst="rect">
             <a:avLst/>
@@ -14227,8 +14134,90 @@
         </p:blipFill>
         <p:spPr bwMode="auto">
           <a:xfrm>
-            <a:off x="2915816" y="1338891"/>
-            <a:ext cx="5688632" cy="2586974"/>
+            <a:off x="3275856" y="1338890"/>
+            <a:ext cx="5328592" cy="2423242"/>
+          </a:xfrm>
+          <a:prstGeom prst="rect">
+            <a:avLst/>
+          </a:prstGeom>
+          <a:noFill/>
+          <a:extLst>
+            <a:ext uri="{909E8E84-426E-40DD-AFC4-6F175D3DCCD1}">
+              <a14:hiddenFill xmlns:a14="http://schemas.microsoft.com/office/drawing/2010/main">
+                <a:solidFill>
+                  <a:srgbClr val="FFFFFF"/>
+                </a:solidFill>
+              </a14:hiddenFill>
+            </a:ext>
+          </a:extLst>
+        </p:spPr>
+      </p:pic>
+      <p:pic>
+        <p:nvPicPr>
+          <p:cNvPr id="2050" name="Picture 2" descr="https://www.devonblog.com/wp-content/uploads/2018/08/jwt_05.jpg"/>
+          <p:cNvPicPr>
+            <a:picLocks noChangeAspect="1" noChangeArrowheads="1"/>
+          </p:cNvPicPr>
+          <p:nvPr/>
+        </p:nvPicPr>
+        <p:blipFill>
+          <a:blip r:embed="rId5" cstate="print">
+            <a:extLst>
+              <a:ext uri="{28A0092B-C50C-407E-A947-70E740481C1C}">
+                <a14:useLocalDpi xmlns:a14="http://schemas.microsoft.com/office/drawing/2010/main" val="0"/>
+              </a:ext>
+            </a:extLst>
+          </a:blip>
+          <a:srcRect/>
+          <a:stretch>
+            <a:fillRect/>
+          </a:stretch>
+        </p:blipFill>
+        <p:spPr bwMode="auto">
+          <a:xfrm>
+            <a:off x="4788024" y="4509120"/>
+            <a:ext cx="2920792" cy="1752475"/>
+          </a:xfrm>
+          <a:prstGeom prst="rect">
+            <a:avLst/>
+          </a:prstGeom>
+          <a:noFill/>
+          <a:extLst>
+            <a:ext uri="{909E8E84-426E-40DD-AFC4-6F175D3DCCD1}">
+              <a14:hiddenFill xmlns:a14="http://schemas.microsoft.com/office/drawing/2010/main">
+                <a:solidFill>
+                  <a:srgbClr val="FFFFFF"/>
+                </a:solidFill>
+              </a14:hiddenFill>
+            </a:ext>
+          </a:extLst>
+        </p:spPr>
+      </p:pic>
+      <p:pic>
+        <p:nvPicPr>
+          <p:cNvPr id="2052" name="Picture 4" descr="https://miro.medium.com/max/1400/1*X0TrU4AqW_u8x_GpgEGhGg.png"/>
+          <p:cNvPicPr>
+            <a:picLocks noChangeAspect="1" noChangeArrowheads="1"/>
+          </p:cNvPicPr>
+          <p:nvPr/>
+        </p:nvPicPr>
+        <p:blipFill>
+          <a:blip r:embed="rId6" cstate="print">
+            <a:extLst>
+              <a:ext uri="{28A0092B-C50C-407E-A947-70E740481C1C}">
+                <a14:useLocalDpi xmlns:a14="http://schemas.microsoft.com/office/drawing/2010/main" val="0"/>
+              </a:ext>
+            </a:extLst>
+          </a:blip>
+          <a:srcRect/>
+          <a:stretch>
+            <a:fillRect/>
+          </a:stretch>
+        </p:blipFill>
+        <p:spPr bwMode="auto">
+          <a:xfrm>
+            <a:off x="362262" y="3623098"/>
+            <a:ext cx="4947236" cy="1515975"/>
           </a:xfrm>
           <a:prstGeom prst="rect">
             <a:avLst/>
@@ -14885,7 +14874,7 @@
         </p:nvSpPr>
         <p:spPr>
           <a:xfrm>
-            <a:off x="971600" y="2924944"/>
+            <a:off x="899592" y="836712"/>
             <a:ext cx="7024744" cy="710952"/>
           </a:xfrm>
         </p:spPr>
@@ -14902,25 +14891,70 @@
           </a:p>
         </p:txBody>
       </p:sp>
-      <p:sp>
-        <p:nvSpPr>
-          <p:cNvPr id="3" name="Content Placeholder 2"/>
-          <p:cNvSpPr>
-            <a:spLocks noGrp="1"/>
-          </p:cNvSpPr>
-          <p:nvPr>
-            <p:ph idx="1"/>
-          </p:nvPr>
-        </p:nvSpPr>
-        <p:spPr/>
-        <p:txBody>
-          <a:bodyPr/>
-          <a:lstStyle/>
-          <a:p>
-            <a:endParaRPr lang="en-US" dirty="0"/>
-          </a:p>
-        </p:txBody>
-      </p:sp>
+      <p:pic>
+        <p:nvPicPr>
+          <p:cNvPr id="1026" name="Picture 2"/>
+          <p:cNvPicPr>
+            <a:picLocks noChangeAspect="1" noChangeArrowheads="1"/>
+          </p:cNvPicPr>
+          <p:nvPr/>
+        </p:nvPicPr>
+        <p:blipFill>
+          <a:blip r:embed="rId2">
+            <a:extLst>
+              <a:ext uri="{28A0092B-C50C-407E-A947-70E740481C1C}">
+                <a14:useLocalDpi xmlns:a14="http://schemas.microsoft.com/office/drawing/2010/main" val="0"/>
+              </a:ext>
+            </a:extLst>
+          </a:blip>
+          <a:srcRect/>
+          <a:stretch>
+            <a:fillRect/>
+          </a:stretch>
+        </p:blipFill>
+        <p:spPr bwMode="auto">
+          <a:xfrm>
+            <a:off x="1653357" y="2132856"/>
+            <a:ext cx="5800725" cy="3381375"/>
+          </a:xfrm>
+          <a:prstGeom prst="rect">
+            <a:avLst/>
+          </a:prstGeom>
+          <a:noFill/>
+          <a:ln>
+            <a:noFill/>
+          </a:ln>
+          <a:effectLst/>
+          <a:extLst>
+            <a:ext uri="{909E8E84-426E-40DD-AFC4-6F175D3DCCD1}">
+              <a14:hiddenFill xmlns:a14="http://schemas.microsoft.com/office/drawing/2010/main">
+                <a:solidFill>
+                  <a:schemeClr val="accent1"/>
+                </a:solidFill>
+              </a14:hiddenFill>
+            </a:ext>
+            <a:ext uri="{91240B29-F687-4F45-9708-019B960494DF}">
+              <a14:hiddenLine xmlns:a14="http://schemas.microsoft.com/office/drawing/2010/main" w="9525">
+                <a:solidFill>
+                  <a:schemeClr val="tx1"/>
+                </a:solidFill>
+                <a:miter lim="800000"/>
+                <a:headEnd/>
+                <a:tailEnd/>
+              </a14:hiddenLine>
+            </a:ext>
+            <a:ext uri="{AF507438-7753-43E0-B8FC-AC1667EBCBE1}">
+              <a14:hiddenEffects xmlns:a14="http://schemas.microsoft.com/office/drawing/2010/main">
+                <a:effectLst>
+                  <a:outerShdw dist="35921" dir="2700000" algn="ctr" rotWithShape="0">
+                    <a:schemeClr val="bg2"/>
+                  </a:outerShdw>
+                </a:effectLst>
+              </a14:hiddenEffects>
+            </a:ext>
+          </a:extLst>
+        </p:spPr>
+      </p:pic>
     </p:spTree>
     <p:extLst>
       <p:ext uri="{BB962C8B-B14F-4D97-AF65-F5344CB8AC3E}">
@@ -14963,38 +14997,8 @@
         </p:nvSpPr>
         <p:spPr>
           <a:xfrm>
-            <a:off x="1043608" y="332656"/>
-            <a:ext cx="7024744" cy="1143000"/>
-          </a:xfrm>
-        </p:spPr>
-        <p:txBody>
-          <a:bodyPr>
-            <a:normAutofit/>
-          </a:bodyPr>
-          <a:lstStyle/>
-          <a:p>
-            <a:r>
-              <a:rPr lang="en-US" dirty="0" smtClean="0"/>
-              <a:t>Development Plan</a:t>
-            </a:r>
-            <a:endParaRPr lang="en-US" dirty="0"/>
-          </a:p>
-        </p:txBody>
-      </p:sp>
-      <p:sp>
-        <p:nvSpPr>
-          <p:cNvPr id="3" name="Content Placeholder 2"/>
-          <p:cNvSpPr>
-            <a:spLocks noGrp="1"/>
-          </p:cNvSpPr>
-          <p:nvPr>
-            <p:ph idx="1"/>
-          </p:nvPr>
-        </p:nvSpPr>
-        <p:spPr>
-          <a:xfrm>
-            <a:off x="755576" y="1700808"/>
-            <a:ext cx="7488832" cy="3508977"/>
+            <a:off x="971600" y="3501008"/>
+            <a:ext cx="7024744" cy="638944"/>
           </a:xfrm>
         </p:spPr>
         <p:txBody>
@@ -15003,40 +15007,19 @@
           </a:bodyPr>
           <a:lstStyle/>
           <a:p>
-            <a:pPr algn="just"/>
+            <a:pPr algn="ctr"/>
             <a:r>
-              <a:rPr lang="en-US" sz="2800" dirty="0" smtClean="0"/>
-              <a:t>User’s role for Eat, Cook, Repeat (User, Admin, Chef, etc.)</a:t>
+              <a:rPr lang="en-US" sz="4800" dirty="0" smtClean="0"/>
+              <a:t>Any Question Before Closing?</a:t>
             </a:r>
-          </a:p>
-          <a:p>
-            <a:pPr algn="just"/>
-            <a:r>
-              <a:rPr lang="en-US" sz="2800" dirty="0" smtClean="0"/>
-              <a:t>New data for some food categories and tastes, for more specific recipe data</a:t>
-            </a:r>
-          </a:p>
-          <a:p>
-            <a:pPr algn="just"/>
-            <a:r>
-              <a:rPr lang="en-US" sz="2800" dirty="0" smtClean="0"/>
-              <a:t>Some great and special food categories in New Recipe menu (the latest recipes)</a:t>
-            </a:r>
-          </a:p>
-          <a:p>
-            <a:pPr algn="just"/>
-            <a:r>
-              <a:rPr lang="en-US" sz="2800" dirty="0" smtClean="0"/>
-              <a:t>Database and tables for users in profile editing, recipe saving and recipe liking</a:t>
-            </a:r>
-            <a:endParaRPr lang="en-US" sz="2800" dirty="0"/>
+            <a:endParaRPr lang="en-US" sz="4800" dirty="0"/>
           </a:p>
         </p:txBody>
       </p:sp>
     </p:spTree>
     <p:extLst>
       <p:ext uri="{BB962C8B-B14F-4D97-AF65-F5344CB8AC3E}">
-        <p14:creationId xmlns:p14="http://schemas.microsoft.com/office/powerpoint/2010/main" val="2725246821"/>
+        <p14:creationId xmlns:p14="http://schemas.microsoft.com/office/powerpoint/2010/main" val="3075179201"/>
       </p:ext>
     </p:extLst>
   </p:cSld>

</xml_diff>

<commit_message>
Update in README with code fixing with ESLint and Prettier
</commit_message>
<xml_diff>
--- a/eat-cook-repeat/EAT, COOK, REPEAT.pptx
+++ b/eat-cook-repeat/EAT, COOK, REPEAT.pptx
@@ -7,14 +7,16 @@
   <p:sldIdLst>
     <p:sldId id="256" r:id="rId2"/>
     <p:sldId id="257" r:id="rId3"/>
-    <p:sldId id="258" r:id="rId4"/>
-    <p:sldId id="259" r:id="rId5"/>
-    <p:sldId id="260" r:id="rId6"/>
-    <p:sldId id="261" r:id="rId7"/>
-    <p:sldId id="262" r:id="rId8"/>
-    <p:sldId id="263" r:id="rId9"/>
-    <p:sldId id="265" r:id="rId10"/>
-    <p:sldId id="266" r:id="rId11"/>
+    <p:sldId id="268" r:id="rId4"/>
+    <p:sldId id="258" r:id="rId5"/>
+    <p:sldId id="267" r:id="rId6"/>
+    <p:sldId id="259" r:id="rId7"/>
+    <p:sldId id="260" r:id="rId8"/>
+    <p:sldId id="261" r:id="rId9"/>
+    <p:sldId id="262" r:id="rId10"/>
+    <p:sldId id="263" r:id="rId11"/>
+    <p:sldId id="265" r:id="rId12"/>
+    <p:sldId id="266" r:id="rId13"/>
   </p:sldIdLst>
   <p:sldSz cx="9144000" cy="6858000" type="screen4x3"/>
   <p:notesSz cx="6858000" cy="9144000"/>
@@ -2873,7 +2875,7 @@
           <a:p>
             <a:fld id="{D4FF8C98-F944-4A05-9C25-99505F4B14BA}" type="datetimeFigureOut">
               <a:rPr lang="en-US" smtClean="0"/>
-              <a:t>4/4/2022</a:t>
+              <a:t>4/5/2022</a:t>
             </a:fld>
             <a:endParaRPr lang="en-US"/>
           </a:p>
@@ -3158,7 +3160,7 @@
           <a:p>
             <a:fld id="{D4FF8C98-F944-4A05-9C25-99505F4B14BA}" type="datetimeFigureOut">
               <a:rPr lang="en-US" smtClean="0"/>
-              <a:t>4/4/2022</a:t>
+              <a:t>4/5/2022</a:t>
             </a:fld>
             <a:endParaRPr lang="en-US"/>
           </a:p>
@@ -3333,7 +3335,7 @@
           <a:p>
             <a:fld id="{D4FF8C98-F944-4A05-9C25-99505F4B14BA}" type="datetimeFigureOut">
               <a:rPr lang="en-US" smtClean="0"/>
-              <a:t>4/4/2022</a:t>
+              <a:t>4/5/2022</a:t>
             </a:fld>
             <a:endParaRPr lang="en-US"/>
           </a:p>
@@ -3498,7 +3500,7 @@
           <a:p>
             <a:fld id="{D4FF8C98-F944-4A05-9C25-99505F4B14BA}" type="datetimeFigureOut">
               <a:rPr lang="en-US" smtClean="0"/>
-              <a:t>4/4/2022</a:t>
+              <a:t>4/5/2022</a:t>
             </a:fld>
             <a:endParaRPr lang="en-US"/>
           </a:p>
@@ -3739,7 +3741,7 @@
           <a:p>
             <a:fld id="{D4FF8C98-F944-4A05-9C25-99505F4B14BA}" type="datetimeFigureOut">
               <a:rPr lang="en-US" smtClean="0"/>
-              <a:t>4/4/2022</a:t>
+              <a:t>4/5/2022</a:t>
             </a:fld>
             <a:endParaRPr lang="en-US"/>
           </a:p>
@@ -3852,7 +3854,7 @@
           <a:p>
             <a:fld id="{D4FF8C98-F944-4A05-9C25-99505F4B14BA}" type="datetimeFigureOut">
               <a:rPr lang="en-US" smtClean="0"/>
-              <a:t>4/4/2022</a:t>
+              <a:t>4/5/2022</a:t>
             </a:fld>
             <a:endParaRPr lang="en-US"/>
           </a:p>
@@ -4391,7 +4393,7 @@
           <a:p>
             <a:fld id="{D4FF8C98-F944-4A05-9C25-99505F4B14BA}" type="datetimeFigureOut">
               <a:rPr lang="en-US" smtClean="0"/>
-              <a:t>4/4/2022</a:t>
+              <a:t>4/5/2022</a:t>
             </a:fld>
             <a:endParaRPr lang="en-US"/>
           </a:p>
@@ -4504,7 +4506,7 @@
           <a:p>
             <a:fld id="{D4FF8C98-F944-4A05-9C25-99505F4B14BA}" type="datetimeFigureOut">
               <a:rPr lang="en-US" smtClean="0"/>
-              <a:t>4/4/2022</a:t>
+              <a:t>4/5/2022</a:t>
             </a:fld>
             <a:endParaRPr lang="en-US"/>
           </a:p>
@@ -4594,7 +4596,7 @@
           <a:p>
             <a:fld id="{D4FF8C98-F944-4A05-9C25-99505F4B14BA}" type="datetimeFigureOut">
               <a:rPr lang="en-US" smtClean="0"/>
-              <a:t>4/4/2022</a:t>
+              <a:t>4/5/2022</a:t>
             </a:fld>
             <a:endParaRPr lang="en-US"/>
           </a:p>
@@ -7245,7 +7247,7 @@
           <a:p>
             <a:fld id="{D4FF8C98-F944-4A05-9C25-99505F4B14BA}" type="datetimeFigureOut">
               <a:rPr lang="en-US" smtClean="0"/>
-              <a:t>4/4/2022</a:t>
+              <a:t>4/5/2022</a:t>
             </a:fld>
             <a:endParaRPr lang="en-US"/>
           </a:p>
@@ -10457,7 +10459,7 @@
           <a:p>
             <a:fld id="{D4FF8C98-F944-4A05-9C25-99505F4B14BA}" type="datetimeFigureOut">
               <a:rPr lang="en-US" smtClean="0"/>
-              <a:t>4/4/2022</a:t>
+              <a:t>4/5/2022</a:t>
             </a:fld>
             <a:endParaRPr lang="en-US"/>
           </a:p>
@@ -13279,7 +13281,7 @@
           <a:p>
             <a:fld id="{D4FF8C98-F944-4A05-9C25-99505F4B14BA}" type="datetimeFigureOut">
               <a:rPr lang="en-US" smtClean="0"/>
-              <a:t>4/4/2022</a:t>
+              <a:t>4/5/2022</a:t>
             </a:fld>
             <a:endParaRPr lang="en-US"/>
           </a:p>
@@ -13851,6 +13853,443 @@
         </p:nvSpPr>
         <p:spPr>
           <a:xfrm>
+            <a:off x="-900608" y="481236"/>
+            <a:ext cx="7024744" cy="710952"/>
+          </a:xfrm>
+        </p:spPr>
+        <p:txBody>
+          <a:bodyPr/>
+          <a:lstStyle/>
+          <a:p>
+            <a:pPr algn="ctr"/>
+            <a:r>
+              <a:rPr lang="en-US" dirty="0" smtClean="0"/>
+              <a:t>API Demo</a:t>
+            </a:r>
+            <a:endParaRPr lang="en-US" dirty="0"/>
+          </a:p>
+        </p:txBody>
+      </p:sp>
+      <p:pic>
+        <p:nvPicPr>
+          <p:cNvPr id="1026" name="Picture 2"/>
+          <p:cNvPicPr>
+            <a:picLocks noChangeAspect="1" noChangeArrowheads="1"/>
+          </p:cNvPicPr>
+          <p:nvPr/>
+        </p:nvPicPr>
+        <p:blipFill>
+          <a:blip r:embed="rId2">
+            <a:extLst>
+              <a:ext uri="{28A0092B-C50C-407E-A947-70E740481C1C}">
+                <a14:useLocalDpi xmlns:a14="http://schemas.microsoft.com/office/drawing/2010/main" val="0"/>
+              </a:ext>
+            </a:extLst>
+          </a:blip>
+          <a:srcRect/>
+          <a:stretch>
+            <a:fillRect/>
+          </a:stretch>
+        </p:blipFill>
+        <p:spPr bwMode="auto">
+          <a:xfrm>
+            <a:off x="4637539" y="836712"/>
+            <a:ext cx="3888432" cy="2266656"/>
+          </a:xfrm>
+          <a:prstGeom prst="rect">
+            <a:avLst/>
+          </a:prstGeom>
+          <a:noFill/>
+          <a:ln>
+            <a:noFill/>
+          </a:ln>
+          <a:effectLst/>
+          <a:extLst>
+            <a:ext uri="{909E8E84-426E-40DD-AFC4-6F175D3DCCD1}">
+              <a14:hiddenFill xmlns:a14="http://schemas.microsoft.com/office/drawing/2010/main">
+                <a:solidFill>
+                  <a:schemeClr val="accent1"/>
+                </a:solidFill>
+              </a14:hiddenFill>
+            </a:ext>
+            <a:ext uri="{91240B29-F687-4F45-9708-019B960494DF}">
+              <a14:hiddenLine xmlns:a14="http://schemas.microsoft.com/office/drawing/2010/main" w="9525">
+                <a:solidFill>
+                  <a:schemeClr val="tx1"/>
+                </a:solidFill>
+                <a:miter lim="800000"/>
+                <a:headEnd/>
+                <a:tailEnd/>
+              </a14:hiddenLine>
+            </a:ext>
+            <a:ext uri="{AF507438-7753-43E0-B8FC-AC1667EBCBE1}">
+              <a14:hiddenEffects xmlns:a14="http://schemas.microsoft.com/office/drawing/2010/main">
+                <a:effectLst>
+                  <a:outerShdw dist="35921" dir="2700000" algn="ctr" rotWithShape="0">
+                    <a:schemeClr val="bg2"/>
+                  </a:outerShdw>
+                </a:effectLst>
+              </a14:hiddenEffects>
+            </a:ext>
+          </a:extLst>
+        </p:spPr>
+      </p:pic>
+      <p:sp>
+        <p:nvSpPr>
+          <p:cNvPr id="3" name="TextBox 2"/>
+          <p:cNvSpPr txBox="1"/>
+          <p:nvPr/>
+        </p:nvSpPr>
+        <p:spPr>
+          <a:xfrm>
+            <a:off x="519000" y="1340768"/>
+            <a:ext cx="3888432" cy="3416320"/>
+          </a:xfrm>
+          <a:prstGeom prst="rect">
+            <a:avLst/>
+          </a:prstGeom>
+          <a:noFill/>
+        </p:spPr>
+        <p:txBody>
+          <a:bodyPr wrap="square" rtlCol="0">
+            <a:spAutoFit/>
+          </a:bodyPr>
+          <a:lstStyle/>
+          <a:p>
+            <a:pPr marL="342900" indent="-342900" algn="just">
+              <a:buFont typeface="+mj-lt"/>
+              <a:buAutoNum type="arabicPeriod"/>
+            </a:pPr>
+            <a:r>
+              <a:rPr lang="en-US" dirty="0" smtClean="0"/>
+              <a:t>localhost:5000/users/register</a:t>
+            </a:r>
+          </a:p>
+          <a:p>
+            <a:pPr marL="342900" indent="-342900" algn="just">
+              <a:buFont typeface="+mj-lt"/>
+              <a:buAutoNum type="arabicPeriod"/>
+            </a:pPr>
+            <a:r>
+              <a:rPr lang="en-US" dirty="0" smtClean="0"/>
+              <a:t>localhost:5000/users/login</a:t>
+            </a:r>
+          </a:p>
+          <a:p>
+            <a:pPr marL="342900" indent="-342900" algn="just">
+              <a:buFont typeface="+mj-lt"/>
+              <a:buAutoNum type="arabicPeriod"/>
+            </a:pPr>
+            <a:r>
+              <a:rPr lang="en-US" dirty="0" smtClean="0"/>
+              <a:t>localhost:5000/users</a:t>
+            </a:r>
+            <a:endParaRPr lang="en-US" dirty="0"/>
+          </a:p>
+          <a:p>
+            <a:pPr marL="342900" indent="-342900" algn="just">
+              <a:buFont typeface="+mj-lt"/>
+              <a:buAutoNum type="arabicPeriod"/>
+            </a:pPr>
+            <a:r>
+              <a:rPr lang="en-US" b="1" i="1" dirty="0" smtClean="0"/>
+              <a:t>localhost:5000/users/activate/:id (for activating user)</a:t>
+            </a:r>
+          </a:p>
+          <a:p>
+            <a:pPr marL="342900" indent="-342900" algn="just">
+              <a:buFont typeface="+mj-lt"/>
+              <a:buAutoNum type="arabicPeriod"/>
+            </a:pPr>
+            <a:r>
+              <a:rPr lang="en-US" b="1" i="1" dirty="0" smtClean="0"/>
+              <a:t>localhost:5000/users/deactivate</a:t>
+            </a:r>
+            <a:r>
+              <a:rPr lang="en-US" b="1" i="1" dirty="0"/>
+              <a:t>/:id (for </a:t>
+            </a:r>
+            <a:r>
+              <a:rPr lang="en-US" b="1" i="1" dirty="0" smtClean="0"/>
+              <a:t>deactivating </a:t>
+            </a:r>
+            <a:r>
+              <a:rPr lang="en-US" b="1" i="1" dirty="0"/>
+              <a:t>user)</a:t>
+            </a:r>
+          </a:p>
+          <a:p>
+            <a:pPr marL="342900" indent="-342900" algn="just">
+              <a:buFont typeface="+mj-lt"/>
+              <a:buAutoNum type="arabicPeriod"/>
+            </a:pPr>
+            <a:r>
+              <a:rPr lang="en-US" i="1" dirty="0" smtClean="0"/>
+              <a:t>localhost:5000/recipes (for listing recipes)</a:t>
+            </a:r>
+            <a:endParaRPr lang="en-US" i="1" dirty="0"/>
+          </a:p>
+          <a:p>
+            <a:pPr marL="342900" indent="-342900" algn="just">
+              <a:buFont typeface="+mj-lt"/>
+              <a:buAutoNum type="arabicPeriod"/>
+            </a:pPr>
+            <a:r>
+              <a:rPr lang="en-US" b="1" dirty="0" smtClean="0"/>
+              <a:t>localhost:5000/recipes/:id (for showing the user’s recipe details)</a:t>
+            </a:r>
+            <a:endParaRPr lang="en-US" b="1" dirty="0"/>
+          </a:p>
+        </p:txBody>
+      </p:sp>
+      <p:sp>
+        <p:nvSpPr>
+          <p:cNvPr id="5" name="TextBox 4"/>
+          <p:cNvSpPr txBox="1"/>
+          <p:nvPr/>
+        </p:nvSpPr>
+        <p:spPr>
+          <a:xfrm>
+            <a:off x="4407432" y="3164681"/>
+            <a:ext cx="4348647" cy="3693319"/>
+          </a:xfrm>
+          <a:prstGeom prst="rect">
+            <a:avLst/>
+          </a:prstGeom>
+          <a:noFill/>
+        </p:spPr>
+        <p:txBody>
+          <a:bodyPr wrap="square" rtlCol="0">
+            <a:spAutoFit/>
+          </a:bodyPr>
+          <a:lstStyle/>
+          <a:p>
+            <a:pPr marL="342900" indent="-342900" algn="just">
+              <a:buFont typeface="+mj-lt"/>
+              <a:buAutoNum type="arabicPeriod" startAt="8"/>
+            </a:pPr>
+            <a:r>
+              <a:rPr lang="en-US" dirty="0" smtClean="0"/>
+              <a:t>localhost:5000/</a:t>
+            </a:r>
+          </a:p>
+          <a:p>
+            <a:pPr marL="342900" indent="-342900" algn="just">
+              <a:buFont typeface="+mj-lt"/>
+              <a:buAutoNum type="arabicPeriod" startAt="8"/>
+            </a:pPr>
+            <a:r>
+              <a:rPr lang="en-US" i="1" dirty="0" smtClean="0"/>
+              <a:t>localhost:5000/recipes (for inserting recipes)</a:t>
+            </a:r>
+          </a:p>
+          <a:p>
+            <a:pPr marL="342900" indent="-342900" algn="just">
+              <a:buFont typeface="+mj-lt"/>
+              <a:buAutoNum type="arabicPeriod" startAt="8"/>
+            </a:pPr>
+            <a:r>
+              <a:rPr lang="en-US" b="1" dirty="0" smtClean="0"/>
+              <a:t>localhost:5000/recipes/:id </a:t>
+            </a:r>
+            <a:r>
+              <a:rPr lang="en-US" b="1" dirty="0"/>
+              <a:t>(for </a:t>
+            </a:r>
+            <a:r>
+              <a:rPr lang="en-US" b="1" dirty="0" smtClean="0"/>
+              <a:t>updating </a:t>
+            </a:r>
+            <a:r>
+              <a:rPr lang="en-US" b="1" dirty="0"/>
+              <a:t>recipes</a:t>
+            </a:r>
+            <a:r>
+              <a:rPr lang="en-US" b="1" dirty="0" smtClean="0"/>
+              <a:t>)</a:t>
+            </a:r>
+          </a:p>
+          <a:p>
+            <a:pPr marL="342900" indent="-342900" algn="just">
+              <a:buFont typeface="+mj-lt"/>
+              <a:buAutoNum type="arabicPeriod" startAt="8"/>
+            </a:pPr>
+            <a:r>
+              <a:rPr lang="en-US" b="1" dirty="0"/>
+              <a:t>localhost:5000/recipes/:id (for </a:t>
+            </a:r>
+            <a:r>
+              <a:rPr lang="en-US" b="1" dirty="0" smtClean="0"/>
+              <a:t>deleting </a:t>
+            </a:r>
+            <a:r>
+              <a:rPr lang="en-US" b="1" dirty="0"/>
+              <a:t>recipes)</a:t>
+            </a:r>
+          </a:p>
+          <a:p>
+            <a:pPr marL="342900" indent="-342900" algn="just">
+              <a:buFont typeface="+mj-lt"/>
+              <a:buAutoNum type="arabicPeriod" startAt="8"/>
+            </a:pPr>
+            <a:r>
+              <a:rPr lang="en-US" b="1" i="1" dirty="0" smtClean="0"/>
+              <a:t>localhost:5000/recipes/deactivate</a:t>
+            </a:r>
+            <a:r>
+              <a:rPr lang="en-US" b="1" i="1" dirty="0"/>
+              <a:t>/:id (for </a:t>
+            </a:r>
+            <a:r>
+              <a:rPr lang="en-US" b="1" i="1" dirty="0" smtClean="0"/>
+              <a:t>deactivating </a:t>
+            </a:r>
+            <a:r>
+              <a:rPr lang="en-US" b="1" i="1" dirty="0"/>
+              <a:t>user)</a:t>
+            </a:r>
+          </a:p>
+          <a:p>
+            <a:pPr marL="342900" indent="-342900" algn="just">
+              <a:buFont typeface="+mj-lt"/>
+              <a:buAutoNum type="arabicPeriod" startAt="8"/>
+            </a:pPr>
+            <a:r>
+              <a:rPr lang="en-US" b="1" i="1" dirty="0" smtClean="0"/>
+              <a:t>localhost:5000/recipes/reactivate</a:t>
+            </a:r>
+            <a:r>
+              <a:rPr lang="en-US" b="1" i="1" dirty="0"/>
+              <a:t>/:id (for </a:t>
+            </a:r>
+            <a:r>
+              <a:rPr lang="en-US" b="1" i="1" dirty="0" smtClean="0"/>
+              <a:t>reactivating </a:t>
+            </a:r>
+            <a:r>
+              <a:rPr lang="en-US" b="1" i="1" dirty="0"/>
+              <a:t>user)</a:t>
+            </a:r>
+          </a:p>
+          <a:p>
+            <a:pPr marL="342900" indent="-342900" algn="just">
+              <a:buFont typeface="+mj-lt"/>
+              <a:buAutoNum type="arabicPeriod" startAt="8"/>
+            </a:pPr>
+            <a:endParaRPr lang="en-US" dirty="0"/>
+          </a:p>
+          <a:p>
+            <a:pPr marL="342900" indent="-342900" algn="just">
+              <a:buFont typeface="+mj-lt"/>
+              <a:buAutoNum type="arabicPeriod" startAt="8"/>
+            </a:pPr>
+            <a:endParaRPr lang="en-US" dirty="0" smtClean="0"/>
+          </a:p>
+        </p:txBody>
+      </p:sp>
+    </p:spTree>
+    <p:extLst>
+      <p:ext uri="{BB962C8B-B14F-4D97-AF65-F5344CB8AC3E}">
+        <p14:creationId xmlns:p14="http://schemas.microsoft.com/office/powerpoint/2010/main" val="3282331888"/>
+      </p:ext>
+    </p:extLst>
+  </p:cSld>
+  <p:clrMapOvr>
+    <a:masterClrMapping/>
+  </p:clrMapOvr>
+</p:sld>
+</file>
+
+<file path=ppt/slides/slide11.xml><?xml version="1.0" encoding="utf-8"?>
+<p:sld xmlns:a="http://schemas.openxmlformats.org/drawingml/2006/main" xmlns:r="http://schemas.openxmlformats.org/officeDocument/2006/relationships" xmlns:p="http://schemas.openxmlformats.org/presentationml/2006/main">
+  <p:cSld>
+    <p:spTree>
+      <p:nvGrpSpPr>
+        <p:cNvPr id="1" name=""/>
+        <p:cNvGrpSpPr/>
+        <p:nvPr/>
+      </p:nvGrpSpPr>
+      <p:grpSpPr>
+        <a:xfrm>
+          <a:off x="0" y="0"/>
+          <a:ext cx="0" cy="0"/>
+          <a:chOff x="0" y="0"/>
+          <a:chExt cx="0" cy="0"/>
+        </a:xfrm>
+      </p:grpSpPr>
+      <p:sp>
+        <p:nvSpPr>
+          <p:cNvPr id="2" name="Title 1"/>
+          <p:cNvSpPr>
+            <a:spLocks noGrp="1"/>
+          </p:cNvSpPr>
+          <p:nvPr>
+            <p:ph type="title"/>
+          </p:nvPr>
+        </p:nvSpPr>
+        <p:spPr>
+          <a:xfrm>
+            <a:off x="971600" y="3501008"/>
+            <a:ext cx="7024744" cy="638944"/>
+          </a:xfrm>
+        </p:spPr>
+        <p:txBody>
+          <a:bodyPr>
+            <a:noAutofit/>
+          </a:bodyPr>
+          <a:lstStyle/>
+          <a:p>
+            <a:pPr algn="ctr"/>
+            <a:r>
+              <a:rPr lang="en-US" sz="4800" dirty="0" smtClean="0"/>
+              <a:t>Any Question Before Closing?</a:t>
+            </a:r>
+            <a:endParaRPr lang="en-US" sz="4800" dirty="0"/>
+          </a:p>
+        </p:txBody>
+      </p:sp>
+    </p:spTree>
+    <p:extLst>
+      <p:ext uri="{BB962C8B-B14F-4D97-AF65-F5344CB8AC3E}">
+        <p14:creationId xmlns:p14="http://schemas.microsoft.com/office/powerpoint/2010/main" val="3075179201"/>
+      </p:ext>
+    </p:extLst>
+  </p:cSld>
+  <p:clrMapOvr>
+    <a:masterClrMapping/>
+  </p:clrMapOvr>
+</p:sld>
+</file>
+
+<file path=ppt/slides/slide12.xml><?xml version="1.0" encoding="utf-8"?>
+<p:sld xmlns:a="http://schemas.openxmlformats.org/drawingml/2006/main" xmlns:r="http://schemas.openxmlformats.org/officeDocument/2006/relationships" xmlns:p="http://schemas.openxmlformats.org/presentationml/2006/main">
+  <p:cSld>
+    <p:spTree>
+      <p:nvGrpSpPr>
+        <p:cNvPr id="1" name=""/>
+        <p:cNvGrpSpPr/>
+        <p:nvPr/>
+      </p:nvGrpSpPr>
+      <p:grpSpPr>
+        <a:xfrm>
+          <a:off x="0" y="0"/>
+          <a:ext cx="0" cy="0"/>
+          <a:chOff x="0" y="0"/>
+          <a:chExt cx="0" cy="0"/>
+        </a:xfrm>
+      </p:grpSpPr>
+      <p:sp>
+        <p:nvSpPr>
+          <p:cNvPr id="2" name="Title 1"/>
+          <p:cNvSpPr>
+            <a:spLocks noGrp="1"/>
+          </p:cNvSpPr>
+          <p:nvPr>
+            <p:ph type="title"/>
+          </p:nvPr>
+        </p:nvSpPr>
+        <p:spPr>
+          <a:xfrm>
             <a:off x="971600" y="3068960"/>
             <a:ext cx="7024744" cy="638944"/>
           </a:xfrm>
@@ -14052,7 +14491,7 @@
         </p:blipFill>
         <p:spPr bwMode="auto">
           <a:xfrm>
-            <a:off x="589952" y="1882536"/>
+            <a:off x="663230" y="1958691"/>
             <a:ext cx="2232247" cy="1335950"/>
           </a:xfrm>
           <a:prstGeom prst="rect">
@@ -14093,8 +14532,8 @@
         </p:blipFill>
         <p:spPr bwMode="auto">
           <a:xfrm>
-            <a:off x="755576" y="5139073"/>
-            <a:ext cx="3101054" cy="1296144"/>
+            <a:off x="465844" y="4396052"/>
+            <a:ext cx="2676466" cy="1118679"/>
           </a:xfrm>
           <a:prstGeom prst="rect">
             <a:avLst/>
@@ -14111,6 +14550,217 @@
           </a:extLst>
         </p:spPr>
       </p:pic>
+      <p:sp>
+        <p:nvSpPr>
+          <p:cNvPr id="3" name="TextBox 2"/>
+          <p:cNvSpPr txBox="1"/>
+          <p:nvPr/>
+        </p:nvSpPr>
+        <p:spPr>
+          <a:xfrm>
+            <a:off x="3203848" y="1772816"/>
+            <a:ext cx="4608512" cy="369332"/>
+          </a:xfrm>
+          <a:prstGeom prst="rect">
+            <a:avLst/>
+          </a:prstGeom>
+          <a:noFill/>
+        </p:spPr>
+        <p:txBody>
+          <a:bodyPr wrap="square" rtlCol="0">
+            <a:spAutoFit/>
+          </a:bodyPr>
+          <a:lstStyle/>
+          <a:p>
+            <a:endParaRPr lang="en-US" dirty="0"/>
+          </a:p>
+        </p:txBody>
+      </p:sp>
+      <p:sp>
+        <p:nvSpPr>
+          <p:cNvPr id="4" name="TextBox 3"/>
+          <p:cNvSpPr txBox="1"/>
+          <p:nvPr/>
+        </p:nvSpPr>
+        <p:spPr>
+          <a:xfrm>
+            <a:off x="3203848" y="1664864"/>
+            <a:ext cx="5112568" cy="1923604"/>
+          </a:xfrm>
+          <a:prstGeom prst="rect">
+            <a:avLst/>
+          </a:prstGeom>
+          <a:noFill/>
+        </p:spPr>
+        <p:txBody>
+          <a:bodyPr wrap="square" rtlCol="0">
+            <a:spAutoFit/>
+          </a:bodyPr>
+          <a:lstStyle/>
+          <a:p>
+            <a:pPr algn="just"/>
+            <a:r>
+              <a:rPr lang="en-US" sz="1700" dirty="0" smtClean="0"/>
+              <a:t>A </a:t>
+            </a:r>
+            <a:r>
+              <a:rPr lang="en-US" sz="1700" dirty="0"/>
+              <a:t>back end web application framework for Node.js, released as free and open-source </a:t>
+            </a:r>
+          </a:p>
+          <a:p>
+            <a:pPr algn="just"/>
+            <a:r>
+              <a:rPr lang="en-US" sz="1700" dirty="0"/>
+              <a:t>software under the MIT License. It is designed for building web applications and APIs. It has been </a:t>
+            </a:r>
+          </a:p>
+          <a:p>
+            <a:pPr algn="just"/>
+            <a:r>
+              <a:rPr lang="en-US" sz="1700" dirty="0"/>
+              <a:t>called the de facto standard server framework for </a:t>
+            </a:r>
+            <a:r>
+              <a:rPr lang="en-US" sz="1700" dirty="0" smtClean="0"/>
+              <a:t>Node.js (Wikipedia, 2022)</a:t>
+            </a:r>
+          </a:p>
+        </p:txBody>
+      </p:sp>
+      <p:sp>
+        <p:nvSpPr>
+          <p:cNvPr id="8" name="TextBox 7"/>
+          <p:cNvSpPr txBox="1"/>
+          <p:nvPr/>
+        </p:nvSpPr>
+        <p:spPr>
+          <a:xfrm>
+            <a:off x="3203848" y="3861048"/>
+            <a:ext cx="5112568" cy="2862322"/>
+          </a:xfrm>
+          <a:prstGeom prst="rect">
+            <a:avLst/>
+          </a:prstGeom>
+          <a:noFill/>
+        </p:spPr>
+        <p:txBody>
+          <a:bodyPr wrap="square" rtlCol="0">
+            <a:spAutoFit/>
+          </a:bodyPr>
+          <a:lstStyle/>
+          <a:p>
+            <a:pPr algn="just"/>
+            <a:r>
+              <a:rPr lang="en-US" dirty="0" smtClean="0"/>
+              <a:t>Also </a:t>
+            </a:r>
+            <a:r>
+              <a:rPr lang="en-US" dirty="0"/>
+              <a:t>known as </a:t>
+            </a:r>
+            <a:r>
+              <a:rPr lang="en-US" dirty="0" err="1"/>
+              <a:t>Postgres</a:t>
+            </a:r>
+            <a:r>
+              <a:rPr lang="en-US" dirty="0"/>
+              <a:t>, is a free and open-source relational database management system </a:t>
+            </a:r>
+          </a:p>
+          <a:p>
+            <a:pPr algn="just"/>
+            <a:r>
+              <a:rPr lang="en-US" dirty="0"/>
+              <a:t>emphasizing extensibility and SQL compliance. It was originally named POSTGRES, referring to its origins </a:t>
+            </a:r>
+          </a:p>
+          <a:p>
+            <a:pPr algn="just"/>
+            <a:r>
+              <a:rPr lang="en-US" dirty="0"/>
+              <a:t>as a successor to the Ingres database developed at the University of California, </a:t>
+            </a:r>
+            <a:r>
+              <a:rPr lang="en-US" dirty="0" smtClean="0"/>
+              <a:t>Berkeley </a:t>
+            </a:r>
+            <a:r>
+              <a:rPr lang="en-US" dirty="0"/>
+              <a:t>(Wikipedia, 2022)</a:t>
+            </a:r>
+          </a:p>
+          <a:p>
+            <a:pPr algn="just"/>
+            <a:endParaRPr lang="en-US" dirty="0"/>
+          </a:p>
+        </p:txBody>
+      </p:sp>
+    </p:spTree>
+    <p:extLst>
+      <p:ext uri="{BB962C8B-B14F-4D97-AF65-F5344CB8AC3E}">
+        <p14:creationId xmlns:p14="http://schemas.microsoft.com/office/powerpoint/2010/main" val="1973943043"/>
+      </p:ext>
+    </p:extLst>
+  </p:cSld>
+  <p:clrMapOvr>
+    <a:masterClrMapping/>
+  </p:clrMapOvr>
+  <p:timing>
+    <p:tnLst>
+      <p:par>
+        <p:cTn id="1" dur="indefinite" restart="never" nodeType="tmRoot"/>
+      </p:par>
+    </p:tnLst>
+  </p:timing>
+</p:sld>
+</file>
+
+<file path=ppt/slides/slide4.xml><?xml version="1.0" encoding="utf-8"?>
+<p:sld xmlns:a="http://schemas.openxmlformats.org/drawingml/2006/main" xmlns:r="http://schemas.openxmlformats.org/officeDocument/2006/relationships" xmlns:p="http://schemas.openxmlformats.org/presentationml/2006/main">
+  <p:cSld>
+    <p:spTree>
+      <p:nvGrpSpPr>
+        <p:cNvPr id="1" name=""/>
+        <p:cNvGrpSpPr/>
+        <p:nvPr/>
+      </p:nvGrpSpPr>
+      <p:grpSpPr>
+        <a:xfrm>
+          <a:off x="0" y="0"/>
+          <a:ext cx="0" cy="0"/>
+          <a:chOff x="0" y="0"/>
+          <a:chExt cx="0" cy="0"/>
+        </a:xfrm>
+      </p:grpSpPr>
+      <p:sp>
+        <p:nvSpPr>
+          <p:cNvPr id="2" name="Title 1"/>
+          <p:cNvSpPr>
+            <a:spLocks noGrp="1"/>
+          </p:cNvSpPr>
+          <p:nvPr>
+            <p:ph type="title"/>
+          </p:nvPr>
+        </p:nvSpPr>
+        <p:spPr>
+          <a:xfrm>
+            <a:off x="1043608" y="548680"/>
+            <a:ext cx="7024744" cy="792088"/>
+          </a:xfrm>
+        </p:spPr>
+        <p:txBody>
+          <a:bodyPr/>
+          <a:lstStyle/>
+          <a:p>
+            <a:r>
+              <a:rPr lang="en-US" dirty="0" smtClean="0"/>
+              <a:t>Tech Stack</a:t>
+            </a:r>
+            <a:endParaRPr lang="en-US" dirty="0"/>
+          </a:p>
+        </p:txBody>
+      </p:sp>
       <p:pic>
         <p:nvPicPr>
           <p:cNvPr id="1030" name="Picture 6" descr="https://belajarphp.net/wp-content/uploads/2016/08/codeigniter_api-1-840x382.jpg"/>
@@ -14120,7 +14770,7 @@
           <p:nvPr/>
         </p:nvPicPr>
         <p:blipFill>
-          <a:blip r:embed="rId4">
+          <a:blip r:embed="rId2">
             <a:extLst>
               <a:ext uri="{28A0092B-C50C-407E-A947-70E740481C1C}">
                 <a14:useLocalDpi xmlns:a14="http://schemas.microsoft.com/office/drawing/2010/main" val="0"/>
@@ -14134,8 +14784,8 @@
         </p:blipFill>
         <p:spPr bwMode="auto">
           <a:xfrm>
-            <a:off x="3275856" y="1338890"/>
-            <a:ext cx="5328592" cy="2423242"/>
+            <a:off x="1478676" y="1700808"/>
+            <a:ext cx="6333684" cy="2880320"/>
           </a:xfrm>
           <a:prstGeom prst="rect">
             <a:avLst/>
@@ -14152,6 +14802,128 @@
           </a:extLst>
         </p:spPr>
       </p:pic>
+      <p:sp>
+        <p:nvSpPr>
+          <p:cNvPr id="3" name="TextBox 2"/>
+          <p:cNvSpPr txBox="1"/>
+          <p:nvPr/>
+        </p:nvSpPr>
+        <p:spPr>
+          <a:xfrm>
+            <a:off x="3203848" y="1772816"/>
+            <a:ext cx="4608512" cy="369332"/>
+          </a:xfrm>
+          <a:prstGeom prst="rect">
+            <a:avLst/>
+          </a:prstGeom>
+          <a:noFill/>
+        </p:spPr>
+        <p:txBody>
+          <a:bodyPr wrap="square" rtlCol="0">
+            <a:spAutoFit/>
+          </a:bodyPr>
+          <a:lstStyle/>
+          <a:p>
+            <a:endParaRPr lang="en-US" dirty="0"/>
+          </a:p>
+        </p:txBody>
+      </p:sp>
+      <p:sp>
+        <p:nvSpPr>
+          <p:cNvPr id="4" name="TextBox 3"/>
+          <p:cNvSpPr txBox="1"/>
+          <p:nvPr/>
+        </p:nvSpPr>
+        <p:spPr>
+          <a:xfrm>
+            <a:off x="1007604" y="4869160"/>
+            <a:ext cx="7272808" cy="1107996"/>
+          </a:xfrm>
+          <a:prstGeom prst="rect">
+            <a:avLst/>
+          </a:prstGeom>
+          <a:noFill/>
+        </p:spPr>
+        <p:txBody>
+          <a:bodyPr wrap="square" rtlCol="0">
+            <a:spAutoFit/>
+          </a:bodyPr>
+          <a:lstStyle/>
+          <a:p>
+            <a:pPr algn="just"/>
+            <a:r>
+              <a:rPr lang="en-US" sz="2200" dirty="0" smtClean="0"/>
+              <a:t>An architecture design of an API where an application can be integrated with another one in a software for data or resource access in the REST</a:t>
+            </a:r>
+            <a:endParaRPr lang="en-US" sz="2200" dirty="0"/>
+          </a:p>
+        </p:txBody>
+      </p:sp>
+    </p:spTree>
+    <p:extLst>
+      <p:ext uri="{BB962C8B-B14F-4D97-AF65-F5344CB8AC3E}">
+        <p14:creationId xmlns:p14="http://schemas.microsoft.com/office/powerpoint/2010/main" val="3160612095"/>
+      </p:ext>
+    </p:extLst>
+  </p:cSld>
+  <p:clrMapOvr>
+    <a:masterClrMapping/>
+  </p:clrMapOvr>
+  <p:timing>
+    <p:tnLst>
+      <p:par>
+        <p:cTn id="1" dur="indefinite" restart="never" nodeType="tmRoot"/>
+      </p:par>
+    </p:tnLst>
+  </p:timing>
+</p:sld>
+</file>
+
+<file path=ppt/slides/slide5.xml><?xml version="1.0" encoding="utf-8"?>
+<p:sld xmlns:a="http://schemas.openxmlformats.org/drawingml/2006/main" xmlns:r="http://schemas.openxmlformats.org/officeDocument/2006/relationships" xmlns:p="http://schemas.openxmlformats.org/presentationml/2006/main">
+  <p:cSld>
+    <p:spTree>
+      <p:nvGrpSpPr>
+        <p:cNvPr id="1" name=""/>
+        <p:cNvGrpSpPr/>
+        <p:nvPr/>
+      </p:nvGrpSpPr>
+      <p:grpSpPr>
+        <a:xfrm>
+          <a:off x="0" y="0"/>
+          <a:ext cx="0" cy="0"/>
+          <a:chOff x="0" y="0"/>
+          <a:chExt cx="0" cy="0"/>
+        </a:xfrm>
+      </p:grpSpPr>
+      <p:sp>
+        <p:nvSpPr>
+          <p:cNvPr id="2" name="Title 1"/>
+          <p:cNvSpPr>
+            <a:spLocks noGrp="1"/>
+          </p:cNvSpPr>
+          <p:nvPr>
+            <p:ph type="title"/>
+          </p:nvPr>
+        </p:nvSpPr>
+        <p:spPr>
+          <a:xfrm>
+            <a:off x="1043608" y="548680"/>
+            <a:ext cx="7024744" cy="792088"/>
+          </a:xfrm>
+        </p:spPr>
+        <p:txBody>
+          <a:bodyPr/>
+          <a:lstStyle/>
+          <a:p>
+            <a:r>
+              <a:rPr lang="en-US" dirty="0" smtClean="0"/>
+              <a:t>Tech Stack</a:t>
+            </a:r>
+            <a:endParaRPr lang="en-US" dirty="0"/>
+          </a:p>
+        </p:txBody>
+      </p:sp>
       <p:pic>
         <p:nvPicPr>
           <p:cNvPr id="2050" name="Picture 2" descr="https://www.devonblog.com/wp-content/uploads/2018/08/jwt_05.jpg"/>
@@ -14161,7 +14933,7 @@
           <p:nvPr/>
         </p:nvPicPr>
         <p:blipFill>
-          <a:blip r:embed="rId5" cstate="print">
+          <a:blip r:embed="rId2" cstate="print">
             <a:extLst>
               <a:ext uri="{28A0092B-C50C-407E-A947-70E740481C1C}">
                 <a14:useLocalDpi xmlns:a14="http://schemas.microsoft.com/office/drawing/2010/main" val="0"/>
@@ -14175,7 +14947,7 @@
         </p:blipFill>
         <p:spPr bwMode="auto">
           <a:xfrm>
-            <a:off x="4788024" y="4509120"/>
+            <a:off x="755576" y="1628800"/>
             <a:ext cx="2920792" cy="1752475"/>
           </a:xfrm>
           <a:prstGeom prst="rect">
@@ -14202,7 +14974,7 @@
           <p:nvPr/>
         </p:nvPicPr>
         <p:blipFill>
-          <a:blip r:embed="rId6" cstate="print">
+          <a:blip r:embed="rId3" cstate="print">
             <a:extLst>
               <a:ext uri="{28A0092B-C50C-407E-A947-70E740481C1C}">
                 <a14:useLocalDpi xmlns:a14="http://schemas.microsoft.com/office/drawing/2010/main" val="0"/>
@@ -14216,7 +14988,7 @@
         </p:blipFill>
         <p:spPr bwMode="auto">
           <a:xfrm>
-            <a:off x="362262" y="3623098"/>
+            <a:off x="-108520" y="4221088"/>
             <a:ext cx="4947236" cy="1515975"/>
           </a:xfrm>
           <a:prstGeom prst="rect">
@@ -14234,10 +15006,119 @@
           </a:extLst>
         </p:spPr>
       </p:pic>
+      <p:sp>
+        <p:nvSpPr>
+          <p:cNvPr id="8" name="TextBox 7"/>
+          <p:cNvSpPr txBox="1"/>
+          <p:nvPr/>
+        </p:nvSpPr>
+        <p:spPr>
+          <a:xfrm>
+            <a:off x="4139952" y="1350875"/>
+            <a:ext cx="4068452" cy="2585323"/>
+          </a:xfrm>
+          <a:prstGeom prst="rect">
+            <a:avLst/>
+          </a:prstGeom>
+          <a:noFill/>
+        </p:spPr>
+        <p:txBody>
+          <a:bodyPr wrap="square" rtlCol="0">
+            <a:spAutoFit/>
+          </a:bodyPr>
+          <a:lstStyle/>
+          <a:p>
+            <a:pPr algn="just"/>
+            <a:r>
+              <a:rPr lang="en-US" dirty="0" smtClean="0"/>
+              <a:t>A </a:t>
+            </a:r>
+            <a:r>
+              <a:rPr lang="en-US" dirty="0"/>
+              <a:t>proposed Internet standard for creating data with optional signature and/or optional encryption whose </a:t>
+            </a:r>
+          </a:p>
+          <a:p>
+            <a:pPr algn="just"/>
+            <a:r>
+              <a:rPr lang="en-US" dirty="0"/>
+              <a:t>payload holds JSON that asserts some number of claims. The tokens are signed either using a private secret or a public/private key</a:t>
+            </a:r>
+            <a:r>
+              <a:rPr lang="en-US" dirty="0" smtClean="0"/>
+              <a:t>. (Wikipedia, 2021)</a:t>
+            </a:r>
+            <a:endParaRPr lang="en-US" dirty="0"/>
+          </a:p>
+        </p:txBody>
+      </p:sp>
+      <p:sp>
+        <p:nvSpPr>
+          <p:cNvPr id="10" name="TextBox 9"/>
+          <p:cNvSpPr txBox="1"/>
+          <p:nvPr/>
+        </p:nvSpPr>
+        <p:spPr>
+          <a:xfrm>
+            <a:off x="4211960" y="4216504"/>
+            <a:ext cx="4068452" cy="1754326"/>
+          </a:xfrm>
+          <a:prstGeom prst="rect">
+            <a:avLst/>
+          </a:prstGeom>
+          <a:noFill/>
+        </p:spPr>
+        <p:txBody>
+          <a:bodyPr wrap="square" rtlCol="0">
+            <a:spAutoFit/>
+          </a:bodyPr>
+          <a:lstStyle/>
+          <a:p>
+            <a:pPr algn="just"/>
+            <a:r>
+              <a:rPr lang="en-US" dirty="0" smtClean="0"/>
+              <a:t>A </a:t>
+            </a:r>
+            <a:r>
+              <a:rPr lang="en-US" dirty="0" err="1" smtClean="0"/>
+              <a:t>NodeJS</a:t>
+            </a:r>
+            <a:r>
+              <a:rPr lang="en-US" dirty="0" smtClean="0"/>
+              <a:t> middleware </a:t>
+            </a:r>
+            <a:r>
+              <a:rPr lang="en-US" dirty="0"/>
+              <a:t>for handling </a:t>
+            </a:r>
+            <a:r>
+              <a:rPr lang="en-US" dirty="0"/>
+              <a:t>multipart/form-data</a:t>
+            </a:r>
+            <a:r>
+              <a:rPr lang="en-US" dirty="0"/>
+              <a:t>, which is primarily used for uploading </a:t>
+            </a:r>
+            <a:r>
+              <a:rPr lang="en-US" dirty="0" smtClean="0"/>
+              <a:t>files</a:t>
+            </a:r>
+            <a:r>
+              <a:rPr lang="en-US" dirty="0"/>
+              <a:t>. (https://github.com/expressjs/multer, </a:t>
+            </a:r>
+            <a:r>
+              <a:rPr lang="en-US" dirty="0" smtClean="0"/>
+              <a:t>2021)</a:t>
+            </a:r>
+            <a:endParaRPr lang="en-US" dirty="0"/>
+          </a:p>
+        </p:txBody>
+      </p:sp>
     </p:spTree>
     <p:extLst>
       <p:ext uri="{BB962C8B-B14F-4D97-AF65-F5344CB8AC3E}">
-        <p14:creationId xmlns:p14="http://schemas.microsoft.com/office/powerpoint/2010/main" val="3160612095"/>
+        <p14:creationId xmlns:p14="http://schemas.microsoft.com/office/powerpoint/2010/main" val="3259099862"/>
       </p:ext>
     </p:extLst>
   </p:cSld>
@@ -14254,7 +15135,7 @@
 </p:sld>
 </file>
 
-<file path=ppt/slides/slide4.xml><?xml version="1.0" encoding="utf-8"?>
+<file path=ppt/slides/slide6.xml><?xml version="1.0" encoding="utf-8"?>
 <p:sld xmlns:a="http://schemas.openxmlformats.org/drawingml/2006/main" xmlns:r="http://schemas.openxmlformats.org/officeDocument/2006/relationships" xmlns:p="http://schemas.openxmlformats.org/presentationml/2006/main">
   <p:cSld>
     <p:spTree>
@@ -14403,7 +15284,7 @@
 </p:sld>
 </file>
 
-<file path=ppt/slides/slide5.xml><?xml version="1.0" encoding="utf-8"?>
+<file path=ppt/slides/slide7.xml><?xml version="1.0" encoding="utf-8"?>
 <p:sld xmlns:a="http://schemas.openxmlformats.org/drawingml/2006/main" xmlns:r="http://schemas.openxmlformats.org/officeDocument/2006/relationships" xmlns:p="http://schemas.openxmlformats.org/presentationml/2006/main">
   <p:cSld>
     <p:spTree>
@@ -14552,7 +15433,7 @@
 </p:sld>
 </file>
 
-<file path=ppt/slides/slide6.xml><?xml version="1.0" encoding="utf-8"?>
+<file path=ppt/slides/slide8.xml><?xml version="1.0" encoding="utf-8"?>
 <p:sld xmlns:a="http://schemas.openxmlformats.org/drawingml/2006/main" xmlns:r="http://schemas.openxmlformats.org/officeDocument/2006/relationships" xmlns:p="http://schemas.openxmlformats.org/presentationml/2006/main">
   <p:cSld>
     <p:spTree>
@@ -14701,7 +15582,7 @@
 </p:sld>
 </file>
 
-<file path=ppt/slides/slide7.xml><?xml version="1.0" encoding="utf-8"?>
+<file path=ppt/slides/slide9.xml><?xml version="1.0" encoding="utf-8"?>
 <p:sld xmlns:a="http://schemas.openxmlformats.org/drawingml/2006/main" xmlns:r="http://schemas.openxmlformats.org/officeDocument/2006/relationships" xmlns:p="http://schemas.openxmlformats.org/presentationml/2006/main">
   <p:cSld>
     <p:spTree>
@@ -14836,190 +15717,6 @@
     <p:extLst>
       <p:ext uri="{BB962C8B-B14F-4D97-AF65-F5344CB8AC3E}">
         <p14:creationId xmlns:p14="http://schemas.microsoft.com/office/powerpoint/2010/main" val="3900780855"/>
-      </p:ext>
-    </p:extLst>
-  </p:cSld>
-  <p:clrMapOvr>
-    <a:masterClrMapping/>
-  </p:clrMapOvr>
-</p:sld>
-</file>
-
-<file path=ppt/slides/slide8.xml><?xml version="1.0" encoding="utf-8"?>
-<p:sld xmlns:a="http://schemas.openxmlformats.org/drawingml/2006/main" xmlns:r="http://schemas.openxmlformats.org/officeDocument/2006/relationships" xmlns:p="http://schemas.openxmlformats.org/presentationml/2006/main">
-  <p:cSld>
-    <p:spTree>
-      <p:nvGrpSpPr>
-        <p:cNvPr id="1" name=""/>
-        <p:cNvGrpSpPr/>
-        <p:nvPr/>
-      </p:nvGrpSpPr>
-      <p:grpSpPr>
-        <a:xfrm>
-          <a:off x="0" y="0"/>
-          <a:ext cx="0" cy="0"/>
-          <a:chOff x="0" y="0"/>
-          <a:chExt cx="0" cy="0"/>
-        </a:xfrm>
-      </p:grpSpPr>
-      <p:sp>
-        <p:nvSpPr>
-          <p:cNvPr id="2" name="Title 1"/>
-          <p:cNvSpPr>
-            <a:spLocks noGrp="1"/>
-          </p:cNvSpPr>
-          <p:nvPr>
-            <p:ph type="title"/>
-          </p:nvPr>
-        </p:nvSpPr>
-        <p:spPr>
-          <a:xfrm>
-            <a:off x="899592" y="836712"/>
-            <a:ext cx="7024744" cy="710952"/>
-          </a:xfrm>
-        </p:spPr>
-        <p:txBody>
-          <a:bodyPr/>
-          <a:lstStyle/>
-          <a:p>
-            <a:pPr algn="ctr"/>
-            <a:r>
-              <a:rPr lang="en-US" dirty="0" smtClean="0"/>
-              <a:t>API Demo</a:t>
-            </a:r>
-            <a:endParaRPr lang="en-US" dirty="0"/>
-          </a:p>
-        </p:txBody>
-      </p:sp>
-      <p:pic>
-        <p:nvPicPr>
-          <p:cNvPr id="1026" name="Picture 2"/>
-          <p:cNvPicPr>
-            <a:picLocks noChangeAspect="1" noChangeArrowheads="1"/>
-          </p:cNvPicPr>
-          <p:nvPr/>
-        </p:nvPicPr>
-        <p:blipFill>
-          <a:blip r:embed="rId2">
-            <a:extLst>
-              <a:ext uri="{28A0092B-C50C-407E-A947-70E740481C1C}">
-                <a14:useLocalDpi xmlns:a14="http://schemas.microsoft.com/office/drawing/2010/main" val="0"/>
-              </a:ext>
-            </a:extLst>
-          </a:blip>
-          <a:srcRect/>
-          <a:stretch>
-            <a:fillRect/>
-          </a:stretch>
-        </p:blipFill>
-        <p:spPr bwMode="auto">
-          <a:xfrm>
-            <a:off x="1653357" y="2132856"/>
-            <a:ext cx="5800725" cy="3381375"/>
-          </a:xfrm>
-          <a:prstGeom prst="rect">
-            <a:avLst/>
-          </a:prstGeom>
-          <a:noFill/>
-          <a:ln>
-            <a:noFill/>
-          </a:ln>
-          <a:effectLst/>
-          <a:extLst>
-            <a:ext uri="{909E8E84-426E-40DD-AFC4-6F175D3DCCD1}">
-              <a14:hiddenFill xmlns:a14="http://schemas.microsoft.com/office/drawing/2010/main">
-                <a:solidFill>
-                  <a:schemeClr val="accent1"/>
-                </a:solidFill>
-              </a14:hiddenFill>
-            </a:ext>
-            <a:ext uri="{91240B29-F687-4F45-9708-019B960494DF}">
-              <a14:hiddenLine xmlns:a14="http://schemas.microsoft.com/office/drawing/2010/main" w="9525">
-                <a:solidFill>
-                  <a:schemeClr val="tx1"/>
-                </a:solidFill>
-                <a:miter lim="800000"/>
-                <a:headEnd/>
-                <a:tailEnd/>
-              </a14:hiddenLine>
-            </a:ext>
-            <a:ext uri="{AF507438-7753-43E0-B8FC-AC1667EBCBE1}">
-              <a14:hiddenEffects xmlns:a14="http://schemas.microsoft.com/office/drawing/2010/main">
-                <a:effectLst>
-                  <a:outerShdw dist="35921" dir="2700000" algn="ctr" rotWithShape="0">
-                    <a:schemeClr val="bg2"/>
-                  </a:outerShdw>
-                </a:effectLst>
-              </a14:hiddenEffects>
-            </a:ext>
-          </a:extLst>
-        </p:spPr>
-      </p:pic>
-    </p:spTree>
-    <p:extLst>
-      <p:ext uri="{BB962C8B-B14F-4D97-AF65-F5344CB8AC3E}">
-        <p14:creationId xmlns:p14="http://schemas.microsoft.com/office/powerpoint/2010/main" val="3282331888"/>
-      </p:ext>
-    </p:extLst>
-  </p:cSld>
-  <p:clrMapOvr>
-    <a:masterClrMapping/>
-  </p:clrMapOvr>
-</p:sld>
-</file>
-
-<file path=ppt/slides/slide9.xml><?xml version="1.0" encoding="utf-8"?>
-<p:sld xmlns:a="http://schemas.openxmlformats.org/drawingml/2006/main" xmlns:r="http://schemas.openxmlformats.org/officeDocument/2006/relationships" xmlns:p="http://schemas.openxmlformats.org/presentationml/2006/main">
-  <p:cSld>
-    <p:spTree>
-      <p:nvGrpSpPr>
-        <p:cNvPr id="1" name=""/>
-        <p:cNvGrpSpPr/>
-        <p:nvPr/>
-      </p:nvGrpSpPr>
-      <p:grpSpPr>
-        <a:xfrm>
-          <a:off x="0" y="0"/>
-          <a:ext cx="0" cy="0"/>
-          <a:chOff x="0" y="0"/>
-          <a:chExt cx="0" cy="0"/>
-        </a:xfrm>
-      </p:grpSpPr>
-      <p:sp>
-        <p:nvSpPr>
-          <p:cNvPr id="2" name="Title 1"/>
-          <p:cNvSpPr>
-            <a:spLocks noGrp="1"/>
-          </p:cNvSpPr>
-          <p:nvPr>
-            <p:ph type="title"/>
-          </p:nvPr>
-        </p:nvSpPr>
-        <p:spPr>
-          <a:xfrm>
-            <a:off x="971600" y="3501008"/>
-            <a:ext cx="7024744" cy="638944"/>
-          </a:xfrm>
-        </p:spPr>
-        <p:txBody>
-          <a:bodyPr>
-            <a:noAutofit/>
-          </a:bodyPr>
-          <a:lstStyle/>
-          <a:p>
-            <a:pPr algn="ctr"/>
-            <a:r>
-              <a:rPr lang="en-US" sz="4800" dirty="0" smtClean="0"/>
-              <a:t>Any Question Before Closing?</a:t>
-            </a:r>
-            <a:endParaRPr lang="en-US" sz="4800" dirty="0"/>
-          </a:p>
-        </p:txBody>
-      </p:sp>
-    </p:spTree>
-    <p:extLst>
-      <p:ext uri="{BB962C8B-B14F-4D97-AF65-F5344CB8AC3E}">
-        <p14:creationId xmlns:p14="http://schemas.microsoft.com/office/powerpoint/2010/main" val="3075179201"/>
       </p:ext>
     </p:extLst>
   </p:cSld>

</xml_diff>

<commit_message>
Update presentasi tampilan untuk web MamaRecipe
</commit_message>
<xml_diff>
--- a/eat-cook-repeat/EAT, COOK, REPEAT.pptx
+++ b/eat-cook-repeat/EAT, COOK, REPEAT.pptx
@@ -10,13 +10,16 @@
     <p:sldId id="268" r:id="rId4"/>
     <p:sldId id="258" r:id="rId5"/>
     <p:sldId id="267" r:id="rId6"/>
-    <p:sldId id="259" r:id="rId7"/>
-    <p:sldId id="260" r:id="rId8"/>
-    <p:sldId id="261" r:id="rId9"/>
-    <p:sldId id="262" r:id="rId10"/>
-    <p:sldId id="263" r:id="rId11"/>
-    <p:sldId id="265" r:id="rId12"/>
-    <p:sldId id="266" r:id="rId13"/>
+    <p:sldId id="269" r:id="rId7"/>
+    <p:sldId id="270" r:id="rId8"/>
+    <p:sldId id="259" r:id="rId9"/>
+    <p:sldId id="260" r:id="rId10"/>
+    <p:sldId id="261" r:id="rId11"/>
+    <p:sldId id="262" r:id="rId12"/>
+    <p:sldId id="263" r:id="rId13"/>
+    <p:sldId id="271" r:id="rId14"/>
+    <p:sldId id="265" r:id="rId15"/>
+    <p:sldId id="266" r:id="rId16"/>
   </p:sldIdLst>
   <p:sldSz cx="9144000" cy="6858000" type="screen4x3"/>
   <p:notesSz cx="6858000" cy="9144000"/>
@@ -2875,7 +2878,7 @@
           <a:p>
             <a:fld id="{D4FF8C98-F944-4A05-9C25-99505F4B14BA}" type="datetimeFigureOut">
               <a:rPr lang="en-US" smtClean="0"/>
-              <a:t>4/5/2022</a:t>
+              <a:t>4/12/2022</a:t>
             </a:fld>
             <a:endParaRPr lang="en-US"/>
           </a:p>
@@ -3160,7 +3163,7 @@
           <a:p>
             <a:fld id="{D4FF8C98-F944-4A05-9C25-99505F4B14BA}" type="datetimeFigureOut">
               <a:rPr lang="en-US" smtClean="0"/>
-              <a:t>4/5/2022</a:t>
+              <a:t>4/12/2022</a:t>
             </a:fld>
             <a:endParaRPr lang="en-US"/>
           </a:p>
@@ -3335,7 +3338,7 @@
           <a:p>
             <a:fld id="{D4FF8C98-F944-4A05-9C25-99505F4B14BA}" type="datetimeFigureOut">
               <a:rPr lang="en-US" smtClean="0"/>
-              <a:t>4/5/2022</a:t>
+              <a:t>4/12/2022</a:t>
             </a:fld>
             <a:endParaRPr lang="en-US"/>
           </a:p>
@@ -3500,7 +3503,7 @@
           <a:p>
             <a:fld id="{D4FF8C98-F944-4A05-9C25-99505F4B14BA}" type="datetimeFigureOut">
               <a:rPr lang="en-US" smtClean="0"/>
-              <a:t>4/5/2022</a:t>
+              <a:t>4/12/2022</a:t>
             </a:fld>
             <a:endParaRPr lang="en-US"/>
           </a:p>
@@ -3741,7 +3744,7 @@
           <a:p>
             <a:fld id="{D4FF8C98-F944-4A05-9C25-99505F4B14BA}" type="datetimeFigureOut">
               <a:rPr lang="en-US" smtClean="0"/>
-              <a:t>4/5/2022</a:t>
+              <a:t>4/12/2022</a:t>
             </a:fld>
             <a:endParaRPr lang="en-US"/>
           </a:p>
@@ -3854,7 +3857,7 @@
           <a:p>
             <a:fld id="{D4FF8C98-F944-4A05-9C25-99505F4B14BA}" type="datetimeFigureOut">
               <a:rPr lang="en-US" smtClean="0"/>
-              <a:t>4/5/2022</a:t>
+              <a:t>4/12/2022</a:t>
             </a:fld>
             <a:endParaRPr lang="en-US"/>
           </a:p>
@@ -4393,7 +4396,7 @@
           <a:p>
             <a:fld id="{D4FF8C98-F944-4A05-9C25-99505F4B14BA}" type="datetimeFigureOut">
               <a:rPr lang="en-US" smtClean="0"/>
-              <a:t>4/5/2022</a:t>
+              <a:t>4/12/2022</a:t>
             </a:fld>
             <a:endParaRPr lang="en-US"/>
           </a:p>
@@ -4506,7 +4509,7 @@
           <a:p>
             <a:fld id="{D4FF8C98-F944-4A05-9C25-99505F4B14BA}" type="datetimeFigureOut">
               <a:rPr lang="en-US" smtClean="0"/>
-              <a:t>4/5/2022</a:t>
+              <a:t>4/12/2022</a:t>
             </a:fld>
             <a:endParaRPr lang="en-US"/>
           </a:p>
@@ -4596,7 +4599,7 @@
           <a:p>
             <a:fld id="{D4FF8C98-F944-4A05-9C25-99505F4B14BA}" type="datetimeFigureOut">
               <a:rPr lang="en-US" smtClean="0"/>
-              <a:t>4/5/2022</a:t>
+              <a:t>4/12/2022</a:t>
             </a:fld>
             <a:endParaRPr lang="en-US"/>
           </a:p>
@@ -7247,7 +7250,7 @@
           <a:p>
             <a:fld id="{D4FF8C98-F944-4A05-9C25-99505F4B14BA}" type="datetimeFigureOut">
               <a:rPr lang="en-US" smtClean="0"/>
-              <a:t>4/5/2022</a:t>
+              <a:t>4/12/2022</a:t>
             </a:fld>
             <a:endParaRPr lang="en-US"/>
           </a:p>
@@ -10459,7 +10462,7 @@
           <a:p>
             <a:fld id="{D4FF8C98-F944-4A05-9C25-99505F4B14BA}" type="datetimeFigureOut">
               <a:rPr lang="en-US" smtClean="0"/>
-              <a:t>4/5/2022</a:t>
+              <a:t>4/12/2022</a:t>
             </a:fld>
             <a:endParaRPr lang="en-US"/>
           </a:p>
@@ -13281,7 +13284,7 @@
           <a:p>
             <a:fld id="{D4FF8C98-F944-4A05-9C25-99505F4B14BA}" type="datetimeFigureOut">
               <a:rPr lang="en-US" smtClean="0"/>
-              <a:t>4/5/2022</a:t>
+              <a:t>4/12/2022</a:t>
             </a:fld>
             <a:endParaRPr lang="en-US"/>
           </a:p>
@@ -13749,15 +13752,40 @@
             <p:ph type="ctrTitle"/>
           </p:nvPr>
         </p:nvSpPr>
-        <p:spPr/>
+        <p:spPr>
+          <a:xfrm>
+            <a:off x="4716016" y="3212976"/>
+            <a:ext cx="3313355" cy="1702160"/>
+          </a:xfrm>
+        </p:spPr>
         <p:txBody>
-          <a:bodyPr/>
+          <a:bodyPr>
+            <a:normAutofit fontScale="90000"/>
+          </a:bodyPr>
           <a:lstStyle/>
           <a:p>
             <a:pPr algn="ctr"/>
             <a:r>
               <a:rPr lang="en-US" dirty="0" smtClean="0"/>
-              <a:t>EAT, COOK, REPEAT</a:t>
+              <a:t>EAT, COOK, </a:t>
+            </a:r>
+            <a:r>
+              <a:rPr lang="en-US" dirty="0" smtClean="0"/>
+              <a:t>REPEAT</a:t>
+            </a:r>
+            <a:br>
+              <a:rPr lang="en-US" dirty="0" smtClean="0"/>
+            </a:br>
+            <a:r>
+              <a:rPr lang="en-US" dirty="0" smtClean="0"/>
+              <a:t>a.k.a.</a:t>
+            </a:r>
+            <a:br>
+              <a:rPr lang="en-US" dirty="0" smtClean="0"/>
+            </a:br>
+            <a:r>
+              <a:rPr lang="en-US" dirty="0" smtClean="0"/>
+              <a:t>MAMARECIPE</a:t>
             </a:r>
             <a:endParaRPr lang="en-US" dirty="0"/>
           </a:p>
@@ -13773,7 +13801,12 @@
             <p:ph type="subTitle" idx="1"/>
           </p:nvPr>
         </p:nvSpPr>
-        <p:spPr/>
+        <p:spPr>
+          <a:xfrm>
+            <a:off x="4716016" y="5013176"/>
+            <a:ext cx="3309803" cy="1260629"/>
+          </a:xfrm>
+        </p:spPr>
         <p:txBody>
           <a:bodyPr/>
           <a:lstStyle/>
@@ -13825,6 +13858,299 @@
 </file>
 
 <file path=ppt/slides/slide10.xml><?xml version="1.0" encoding="utf-8"?>
+<p:sld xmlns:a="http://schemas.openxmlformats.org/drawingml/2006/main" xmlns:r="http://schemas.openxmlformats.org/officeDocument/2006/relationships" xmlns:p="http://schemas.openxmlformats.org/presentationml/2006/main">
+  <p:cSld>
+    <p:spTree>
+      <p:nvGrpSpPr>
+        <p:cNvPr id="1" name=""/>
+        <p:cNvGrpSpPr/>
+        <p:nvPr/>
+      </p:nvGrpSpPr>
+      <p:grpSpPr>
+        <a:xfrm>
+          <a:off x="0" y="0"/>
+          <a:ext cx="0" cy="0"/>
+          <a:chOff x="0" y="0"/>
+          <a:chExt cx="0" cy="0"/>
+        </a:xfrm>
+      </p:grpSpPr>
+      <p:sp>
+        <p:nvSpPr>
+          <p:cNvPr id="3" name="Content Placeholder 2"/>
+          <p:cNvSpPr>
+            <a:spLocks noGrp="1"/>
+          </p:cNvSpPr>
+          <p:nvPr>
+            <p:ph idx="1"/>
+          </p:nvPr>
+        </p:nvSpPr>
+        <p:spPr/>
+        <p:txBody>
+          <a:bodyPr/>
+          <a:lstStyle/>
+          <a:p>
+            <a:endParaRPr lang="en-US"/>
+          </a:p>
+        </p:txBody>
+      </p:sp>
+      <p:sp>
+        <p:nvSpPr>
+          <p:cNvPr id="4" name="Title 1"/>
+          <p:cNvSpPr>
+            <a:spLocks noGrp="1"/>
+          </p:cNvSpPr>
+          <p:nvPr>
+            <p:ph type="title"/>
+          </p:nvPr>
+        </p:nvSpPr>
+        <p:spPr>
+          <a:xfrm>
+            <a:off x="1043608" y="692696"/>
+            <a:ext cx="7024744" cy="720080"/>
+          </a:xfrm>
+        </p:spPr>
+        <p:txBody>
+          <a:bodyPr/>
+          <a:lstStyle/>
+          <a:p>
+            <a:pPr algn="ctr"/>
+            <a:r>
+              <a:rPr lang="en-US" dirty="0" smtClean="0"/>
+              <a:t>Recipe CRUD Flowchart</a:t>
+            </a:r>
+            <a:endParaRPr lang="en-US" dirty="0"/>
+          </a:p>
+        </p:txBody>
+      </p:sp>
+      <p:pic>
+        <p:nvPicPr>
+          <p:cNvPr id="4098" name="Picture 2"/>
+          <p:cNvPicPr>
+            <a:picLocks noChangeAspect="1" noChangeArrowheads="1"/>
+          </p:cNvPicPr>
+          <p:nvPr/>
+        </p:nvPicPr>
+        <p:blipFill>
+          <a:blip r:embed="rId2" cstate="print">
+            <a:extLst>
+              <a:ext uri="{28A0092B-C50C-407E-A947-70E740481C1C}">
+                <a14:useLocalDpi xmlns:a14="http://schemas.microsoft.com/office/drawing/2010/main" val="0"/>
+              </a:ext>
+            </a:extLst>
+          </a:blip>
+          <a:srcRect/>
+          <a:stretch>
+            <a:fillRect/>
+          </a:stretch>
+        </p:blipFill>
+        <p:spPr bwMode="auto">
+          <a:xfrm>
+            <a:off x="899592" y="1467624"/>
+            <a:ext cx="7175973" cy="5256584"/>
+          </a:xfrm>
+          <a:prstGeom prst="rect">
+            <a:avLst/>
+          </a:prstGeom>
+          <a:noFill/>
+          <a:ln>
+            <a:noFill/>
+          </a:ln>
+          <a:effectLst/>
+          <a:extLst>
+            <a:ext uri="{909E8E84-426E-40DD-AFC4-6F175D3DCCD1}">
+              <a14:hiddenFill xmlns:a14="http://schemas.microsoft.com/office/drawing/2010/main">
+                <a:solidFill>
+                  <a:schemeClr val="accent1"/>
+                </a:solidFill>
+              </a14:hiddenFill>
+            </a:ext>
+            <a:ext uri="{91240B29-F687-4F45-9708-019B960494DF}">
+              <a14:hiddenLine xmlns:a14="http://schemas.microsoft.com/office/drawing/2010/main" w="9525">
+                <a:solidFill>
+                  <a:schemeClr val="tx1"/>
+                </a:solidFill>
+                <a:miter lim="800000"/>
+                <a:headEnd/>
+                <a:tailEnd/>
+              </a14:hiddenLine>
+            </a:ext>
+            <a:ext uri="{AF507438-7753-43E0-B8FC-AC1667EBCBE1}">
+              <a14:hiddenEffects xmlns:a14="http://schemas.microsoft.com/office/drawing/2010/main">
+                <a:effectLst>
+                  <a:outerShdw dist="35921" dir="2700000" algn="ctr" rotWithShape="0">
+                    <a:schemeClr val="bg2"/>
+                  </a:outerShdw>
+                </a:effectLst>
+              </a14:hiddenEffects>
+            </a:ext>
+          </a:extLst>
+        </p:spPr>
+      </p:pic>
+    </p:spTree>
+    <p:extLst>
+      <p:ext uri="{BB962C8B-B14F-4D97-AF65-F5344CB8AC3E}">
+        <p14:creationId xmlns:p14="http://schemas.microsoft.com/office/powerpoint/2010/main" val="1280948400"/>
+      </p:ext>
+    </p:extLst>
+  </p:cSld>
+  <p:clrMapOvr>
+    <a:masterClrMapping/>
+  </p:clrMapOvr>
+  <p:timing>
+    <p:tnLst>
+      <p:par>
+        <p:cTn id="1" dur="indefinite" restart="never" nodeType="tmRoot"/>
+      </p:par>
+    </p:tnLst>
+  </p:timing>
+</p:sld>
+</file>
+
+<file path=ppt/slides/slide11.xml><?xml version="1.0" encoding="utf-8"?>
+<p:sld xmlns:a="http://schemas.openxmlformats.org/drawingml/2006/main" xmlns:r="http://schemas.openxmlformats.org/officeDocument/2006/relationships" xmlns:p="http://schemas.openxmlformats.org/presentationml/2006/main">
+  <p:cSld>
+    <p:spTree>
+      <p:nvGrpSpPr>
+        <p:cNvPr id="1" name=""/>
+        <p:cNvGrpSpPr/>
+        <p:nvPr/>
+      </p:nvGrpSpPr>
+      <p:grpSpPr>
+        <a:xfrm>
+          <a:off x="0" y="0"/>
+          <a:ext cx="0" cy="0"/>
+          <a:chOff x="0" y="0"/>
+          <a:chExt cx="0" cy="0"/>
+        </a:xfrm>
+      </p:grpSpPr>
+      <p:sp>
+        <p:nvSpPr>
+          <p:cNvPr id="3" name="Content Placeholder 2"/>
+          <p:cNvSpPr>
+            <a:spLocks noGrp="1"/>
+          </p:cNvSpPr>
+          <p:nvPr>
+            <p:ph idx="1"/>
+          </p:nvPr>
+        </p:nvSpPr>
+        <p:spPr/>
+        <p:txBody>
+          <a:bodyPr/>
+          <a:lstStyle/>
+          <a:p>
+            <a:endParaRPr lang="en-US" dirty="0"/>
+          </a:p>
+        </p:txBody>
+      </p:sp>
+      <p:sp>
+        <p:nvSpPr>
+          <p:cNvPr id="4" name="Title 1"/>
+          <p:cNvSpPr>
+            <a:spLocks noGrp="1"/>
+          </p:cNvSpPr>
+          <p:nvPr>
+            <p:ph type="title"/>
+          </p:nvPr>
+        </p:nvSpPr>
+        <p:spPr>
+          <a:xfrm>
+            <a:off x="1043608" y="692696"/>
+            <a:ext cx="7024744" cy="720080"/>
+          </a:xfrm>
+        </p:spPr>
+        <p:txBody>
+          <a:bodyPr>
+            <a:normAutofit fontScale="90000"/>
+          </a:bodyPr>
+          <a:lstStyle/>
+          <a:p>
+            <a:pPr algn="ctr"/>
+            <a:r>
+              <a:rPr lang="en-US" dirty="0" smtClean="0"/>
+              <a:t>Recipe Comment CRUD Flowchart</a:t>
+            </a:r>
+            <a:endParaRPr lang="en-US" dirty="0"/>
+          </a:p>
+        </p:txBody>
+      </p:sp>
+      <p:pic>
+        <p:nvPicPr>
+          <p:cNvPr id="5122" name="Picture 2"/>
+          <p:cNvPicPr>
+            <a:picLocks noChangeAspect="1" noChangeArrowheads="1"/>
+          </p:cNvPicPr>
+          <p:nvPr/>
+        </p:nvPicPr>
+        <p:blipFill>
+          <a:blip r:embed="rId2">
+            <a:extLst>
+              <a:ext uri="{28A0092B-C50C-407E-A947-70E740481C1C}">
+                <a14:useLocalDpi xmlns:a14="http://schemas.microsoft.com/office/drawing/2010/main" val="0"/>
+              </a:ext>
+            </a:extLst>
+          </a:blip>
+          <a:srcRect/>
+          <a:stretch>
+            <a:fillRect/>
+          </a:stretch>
+        </p:blipFill>
+        <p:spPr bwMode="auto">
+          <a:xfrm>
+            <a:off x="226384" y="1605936"/>
+            <a:ext cx="8681368" cy="4617095"/>
+          </a:xfrm>
+          <a:prstGeom prst="rect">
+            <a:avLst/>
+          </a:prstGeom>
+          <a:noFill/>
+          <a:ln>
+            <a:noFill/>
+          </a:ln>
+          <a:effectLst/>
+          <a:extLst>
+            <a:ext uri="{909E8E84-426E-40DD-AFC4-6F175D3DCCD1}">
+              <a14:hiddenFill xmlns:a14="http://schemas.microsoft.com/office/drawing/2010/main">
+                <a:solidFill>
+                  <a:schemeClr val="accent1"/>
+                </a:solidFill>
+              </a14:hiddenFill>
+            </a:ext>
+            <a:ext uri="{91240B29-F687-4F45-9708-019B960494DF}">
+              <a14:hiddenLine xmlns:a14="http://schemas.microsoft.com/office/drawing/2010/main" w="9525">
+                <a:solidFill>
+                  <a:schemeClr val="tx1"/>
+                </a:solidFill>
+                <a:miter lim="800000"/>
+                <a:headEnd/>
+                <a:tailEnd/>
+              </a14:hiddenLine>
+            </a:ext>
+            <a:ext uri="{AF507438-7753-43E0-B8FC-AC1667EBCBE1}">
+              <a14:hiddenEffects xmlns:a14="http://schemas.microsoft.com/office/drawing/2010/main">
+                <a:effectLst>
+                  <a:outerShdw dist="35921" dir="2700000" algn="ctr" rotWithShape="0">
+                    <a:schemeClr val="bg2"/>
+                  </a:outerShdw>
+                </a:effectLst>
+              </a14:hiddenEffects>
+            </a:ext>
+          </a:extLst>
+        </p:spPr>
+      </p:pic>
+    </p:spTree>
+    <p:extLst>
+      <p:ext uri="{BB962C8B-B14F-4D97-AF65-F5344CB8AC3E}">
+        <p14:creationId xmlns:p14="http://schemas.microsoft.com/office/powerpoint/2010/main" val="3900780855"/>
+      </p:ext>
+    </p:extLst>
+  </p:cSld>
+  <p:clrMapOvr>
+    <a:masterClrMapping/>
+  </p:clrMapOvr>
+</p:sld>
+</file>
+
+<file path=ppt/slides/slide12.xml><?xml version="1.0" encoding="utf-8"?>
 <p:sld xmlns:a="http://schemas.openxmlformats.org/drawingml/2006/main" xmlns:r="http://schemas.openxmlformats.org/officeDocument/2006/relationships" xmlns:p="http://schemas.openxmlformats.org/presentationml/2006/main">
   <p:cSld>
     <p:spTree>
@@ -14200,7 +14526,178 @@
 </p:sld>
 </file>
 
-<file path=ppt/slides/slide11.xml><?xml version="1.0" encoding="utf-8"?>
+<file path=ppt/slides/slide13.xml><?xml version="1.0" encoding="utf-8"?>
+<p:sld xmlns:a="http://schemas.openxmlformats.org/drawingml/2006/main" xmlns:r="http://schemas.openxmlformats.org/officeDocument/2006/relationships" xmlns:p="http://schemas.openxmlformats.org/presentationml/2006/main">
+  <p:cSld>
+    <p:spTree>
+      <p:nvGrpSpPr>
+        <p:cNvPr id="1" name=""/>
+        <p:cNvGrpSpPr/>
+        <p:nvPr/>
+      </p:nvGrpSpPr>
+      <p:grpSpPr>
+        <a:xfrm>
+          <a:off x="0" y="0"/>
+          <a:ext cx="0" cy="0"/>
+          <a:chOff x="0" y="0"/>
+          <a:chExt cx="0" cy="0"/>
+        </a:xfrm>
+      </p:grpSpPr>
+      <p:sp>
+        <p:nvSpPr>
+          <p:cNvPr id="2" name="Title 1"/>
+          <p:cNvSpPr>
+            <a:spLocks noGrp="1"/>
+          </p:cNvSpPr>
+          <p:nvPr>
+            <p:ph type="title"/>
+          </p:nvPr>
+        </p:nvSpPr>
+        <p:spPr/>
+        <p:txBody>
+          <a:bodyPr/>
+          <a:lstStyle/>
+          <a:p>
+            <a:endParaRPr lang="en-US"/>
+          </a:p>
+        </p:txBody>
+      </p:sp>
+      <p:sp>
+        <p:nvSpPr>
+          <p:cNvPr id="3" name="Content Placeholder 2"/>
+          <p:cNvSpPr>
+            <a:spLocks noGrp="1"/>
+          </p:cNvSpPr>
+          <p:nvPr>
+            <p:ph idx="1"/>
+          </p:nvPr>
+        </p:nvSpPr>
+        <p:spPr/>
+        <p:txBody>
+          <a:bodyPr/>
+          <a:lstStyle/>
+          <a:p>
+            <a:endParaRPr lang="en-US"/>
+          </a:p>
+        </p:txBody>
+      </p:sp>
+      <p:sp>
+        <p:nvSpPr>
+          <p:cNvPr id="4" name="Title 1"/>
+          <p:cNvSpPr txBox="1">
+            <a:spLocks/>
+          </p:cNvSpPr>
+          <p:nvPr/>
+        </p:nvSpPr>
+        <p:spPr>
+          <a:xfrm>
+            <a:off x="971600" y="3212976"/>
+            <a:ext cx="7024744" cy="710952"/>
+          </a:xfrm>
+          <a:prstGeom prst="rect">
+            <a:avLst/>
+          </a:prstGeom>
+        </p:spPr>
+        <p:txBody>
+          <a:bodyPr vert="horz" lIns="91440" tIns="45720" rIns="91440" bIns="45720" rtlCol="0" anchor="b">
+            <a:normAutofit/>
+          </a:bodyPr>
+          <a:lstStyle>
+            <a:lvl1pPr algn="l" defTabSz="914400" rtl="0" eaLnBrk="1" latinLnBrk="0" hangingPunct="1">
+              <a:spcBef>
+                <a:spcPct val="0"/>
+              </a:spcBef>
+              <a:buNone/>
+              <a:defRPr sz="4000" kern="1200">
+                <a:solidFill>
+                  <a:schemeClr val="accent1"/>
+                </a:solidFill>
+                <a:latin typeface="+mj-lt"/>
+                <a:ea typeface="+mj-ea"/>
+                <a:cs typeface="+mj-cs"/>
+              </a:defRPr>
+            </a:lvl1pPr>
+            <a:lvl2pPr eaLnBrk="1" hangingPunct="1">
+              <a:defRPr>
+                <a:solidFill>
+                  <a:schemeClr val="tx2"/>
+                </a:solidFill>
+              </a:defRPr>
+            </a:lvl2pPr>
+            <a:lvl3pPr eaLnBrk="1" hangingPunct="1">
+              <a:defRPr>
+                <a:solidFill>
+                  <a:schemeClr val="tx2"/>
+                </a:solidFill>
+              </a:defRPr>
+            </a:lvl3pPr>
+            <a:lvl4pPr eaLnBrk="1" hangingPunct="1">
+              <a:defRPr>
+                <a:solidFill>
+                  <a:schemeClr val="tx2"/>
+                </a:solidFill>
+              </a:defRPr>
+            </a:lvl4pPr>
+            <a:lvl5pPr eaLnBrk="1" hangingPunct="1">
+              <a:defRPr>
+                <a:solidFill>
+                  <a:schemeClr val="tx2"/>
+                </a:solidFill>
+              </a:defRPr>
+            </a:lvl5pPr>
+            <a:lvl6pPr eaLnBrk="1" hangingPunct="1">
+              <a:defRPr>
+                <a:solidFill>
+                  <a:schemeClr val="tx2"/>
+                </a:solidFill>
+              </a:defRPr>
+            </a:lvl6pPr>
+            <a:lvl7pPr eaLnBrk="1" hangingPunct="1">
+              <a:defRPr>
+                <a:solidFill>
+                  <a:schemeClr val="tx2"/>
+                </a:solidFill>
+              </a:defRPr>
+            </a:lvl7pPr>
+            <a:lvl8pPr eaLnBrk="1" hangingPunct="1">
+              <a:defRPr>
+                <a:solidFill>
+                  <a:schemeClr val="tx2"/>
+                </a:solidFill>
+              </a:defRPr>
+            </a:lvl8pPr>
+            <a:lvl9pPr eaLnBrk="1" hangingPunct="1">
+              <a:defRPr>
+                <a:solidFill>
+                  <a:schemeClr val="tx2"/>
+                </a:solidFill>
+              </a:defRPr>
+            </a:lvl9pPr>
+          </a:lstStyle>
+          <a:p>
+            <a:pPr algn="ctr"/>
+            <a:r>
+              <a:rPr lang="en-US" dirty="0" smtClean="0"/>
+              <a:t>Web Design Demo</a:t>
+            </a:r>
+            <a:endParaRPr lang="en-US" dirty="0"/>
+          </a:p>
+        </p:txBody>
+      </p:sp>
+    </p:spTree>
+    <p:extLst>
+      <p:ext uri="{BB962C8B-B14F-4D97-AF65-F5344CB8AC3E}">
+        <p14:creationId xmlns:p14="http://schemas.microsoft.com/office/powerpoint/2010/main" val="2233745621"/>
+      </p:ext>
+    </p:extLst>
+  </p:cSld>
+  <p:clrMapOvr>
+    <a:masterClrMapping/>
+  </p:clrMapOvr>
+</p:sld>
+</file>
+
+<file path=ppt/slides/slide14.xml><?xml version="1.0" encoding="utf-8"?>
 <p:sld xmlns:a="http://schemas.openxmlformats.org/drawingml/2006/main" xmlns:r="http://schemas.openxmlformats.org/officeDocument/2006/relationships" xmlns:p="http://schemas.openxmlformats.org/presentationml/2006/main">
   <p:cSld>
     <p:spTree>
@@ -14261,7 +14758,7 @@
 </p:sld>
 </file>
 
-<file path=ppt/slides/slide12.xml><?xml version="1.0" encoding="utf-8"?>
+<file path=ppt/slides/slide15.xml><?xml version="1.0" encoding="utf-8"?>
 <p:sld xmlns:a="http://schemas.openxmlformats.org/drawingml/2006/main" xmlns:r="http://schemas.openxmlformats.org/officeDocument/2006/relationships" xmlns:p="http://schemas.openxmlformats.org/presentationml/2006/main">
   <p:cSld>
     <p:spTree>
@@ -14462,7 +14959,11 @@
           <a:p>
             <a:r>
               <a:rPr lang="en-US" dirty="0" smtClean="0"/>
-              <a:t>Tech Stack</a:t>
+              <a:t>Tech </a:t>
+            </a:r>
+            <a:r>
+              <a:rPr lang="en-US" dirty="0" smtClean="0"/>
+              <a:t>Stack (Back End)</a:t>
             </a:r>
             <a:endParaRPr lang="en-US" dirty="0"/>
           </a:p>
@@ -14733,34 +15234,6 @@
           <a:chExt cx="0" cy="0"/>
         </a:xfrm>
       </p:grpSpPr>
-      <p:sp>
-        <p:nvSpPr>
-          <p:cNvPr id="2" name="Title 1"/>
-          <p:cNvSpPr>
-            <a:spLocks noGrp="1"/>
-          </p:cNvSpPr>
-          <p:nvPr>
-            <p:ph type="title"/>
-          </p:nvPr>
-        </p:nvSpPr>
-        <p:spPr>
-          <a:xfrm>
-            <a:off x="1043608" y="548680"/>
-            <a:ext cx="7024744" cy="792088"/>
-          </a:xfrm>
-        </p:spPr>
-        <p:txBody>
-          <a:bodyPr/>
-          <a:lstStyle/>
-          <a:p>
-            <a:r>
-              <a:rPr lang="en-US" dirty="0" smtClean="0"/>
-              <a:t>Tech Stack</a:t>
-            </a:r>
-            <a:endParaRPr lang="en-US" dirty="0"/>
-          </a:p>
-        </p:txBody>
-      </p:sp>
       <p:pic>
         <p:nvPicPr>
           <p:cNvPr id="1030" name="Picture 6" descr="https://belajarphp.net/wp-content/uploads/2016/08/codeigniter_api-1-840x382.jpg"/>
@@ -14859,6 +15332,25 @@
           </a:p>
         </p:txBody>
       </p:sp>
+      <p:sp>
+        <p:nvSpPr>
+          <p:cNvPr id="5" name="Title 4"/>
+          <p:cNvSpPr>
+            <a:spLocks noGrp="1"/>
+          </p:cNvSpPr>
+          <p:nvPr>
+            <p:ph type="title"/>
+          </p:nvPr>
+        </p:nvSpPr>
+        <p:spPr/>
+        <p:txBody>
+          <a:bodyPr/>
+          <a:lstStyle/>
+          <a:p>
+            <a:endParaRPr lang="en-US"/>
+          </a:p>
+        </p:txBody>
+      </p:sp>
     </p:spTree>
     <p:extLst>
       <p:ext uri="{BB962C8B-B14F-4D97-AF65-F5344CB8AC3E}">
@@ -14896,34 +15388,6 @@
           <a:chExt cx="0" cy="0"/>
         </a:xfrm>
       </p:grpSpPr>
-      <p:sp>
-        <p:nvSpPr>
-          <p:cNvPr id="2" name="Title 1"/>
-          <p:cNvSpPr>
-            <a:spLocks noGrp="1"/>
-          </p:cNvSpPr>
-          <p:nvPr>
-            <p:ph type="title"/>
-          </p:nvPr>
-        </p:nvSpPr>
-        <p:spPr>
-          <a:xfrm>
-            <a:off x="1043608" y="548680"/>
-            <a:ext cx="7024744" cy="792088"/>
-          </a:xfrm>
-        </p:spPr>
-        <p:txBody>
-          <a:bodyPr/>
-          <a:lstStyle/>
-          <a:p>
-            <a:r>
-              <a:rPr lang="en-US" dirty="0" smtClean="0"/>
-              <a:t>Tech Stack</a:t>
-            </a:r>
-            <a:endParaRPr lang="en-US" dirty="0"/>
-          </a:p>
-        </p:txBody>
-      </p:sp>
       <p:pic>
         <p:nvPicPr>
           <p:cNvPr id="2050" name="Picture 2" descr="https://www.devonblog.com/wp-content/uploads/2018/08/jwt_05.jpg"/>
@@ -15089,15 +15553,7 @@
             </a:r>
             <a:r>
               <a:rPr lang="en-US" dirty="0"/>
-              <a:t>for handling </a:t>
-            </a:r>
-            <a:r>
-              <a:rPr lang="en-US" dirty="0"/>
-              <a:t>multipart/form-data</a:t>
-            </a:r>
-            <a:r>
-              <a:rPr lang="en-US" dirty="0"/>
-              <a:t>, which is primarily used for uploading </a:t>
+              <a:t>for handling multipart/form-data, which is primarily used for uploading </a:t>
             </a:r>
             <a:r>
               <a:rPr lang="en-US" dirty="0" smtClean="0"/>
@@ -15112,6 +15568,25 @@
               <a:t>2021)</a:t>
             </a:r>
             <a:endParaRPr lang="en-US" dirty="0"/>
+          </a:p>
+        </p:txBody>
+      </p:sp>
+      <p:sp>
+        <p:nvSpPr>
+          <p:cNvPr id="4" name="Title 3"/>
+          <p:cNvSpPr>
+            <a:spLocks noGrp="1"/>
+          </p:cNvSpPr>
+          <p:nvPr>
+            <p:ph type="title"/>
+          </p:nvPr>
+        </p:nvSpPr>
+        <p:spPr/>
+        <p:txBody>
+          <a:bodyPr/>
+          <a:lstStyle/>
+          <a:p>
+            <a:endParaRPr lang="en-US"/>
           </a:p>
         </p:txBody>
       </p:sp>
@@ -15136,6 +15611,391 @@
 </file>
 
 <file path=ppt/slides/slide6.xml><?xml version="1.0" encoding="utf-8"?>
+<p:sld xmlns:a="http://schemas.openxmlformats.org/drawingml/2006/main" xmlns:r="http://schemas.openxmlformats.org/officeDocument/2006/relationships" xmlns:p="http://schemas.openxmlformats.org/presentationml/2006/main">
+  <p:cSld>
+    <p:spTree>
+      <p:nvGrpSpPr>
+        <p:cNvPr id="1" name=""/>
+        <p:cNvGrpSpPr/>
+        <p:nvPr/>
+      </p:nvGrpSpPr>
+      <p:grpSpPr>
+        <a:xfrm>
+          <a:off x="0" y="0"/>
+          <a:ext cx="0" cy="0"/>
+          <a:chOff x="0" y="0"/>
+          <a:chExt cx="0" cy="0"/>
+        </a:xfrm>
+      </p:grpSpPr>
+      <p:sp>
+        <p:nvSpPr>
+          <p:cNvPr id="2" name="Title 1"/>
+          <p:cNvSpPr>
+            <a:spLocks noGrp="1"/>
+          </p:cNvSpPr>
+          <p:nvPr>
+            <p:ph type="title"/>
+          </p:nvPr>
+        </p:nvSpPr>
+        <p:spPr>
+          <a:xfrm>
+            <a:off x="1043608" y="548680"/>
+            <a:ext cx="7024744" cy="792088"/>
+          </a:xfrm>
+        </p:spPr>
+        <p:txBody>
+          <a:bodyPr/>
+          <a:lstStyle/>
+          <a:p>
+            <a:r>
+              <a:rPr lang="en-US" dirty="0" smtClean="0"/>
+              <a:t>Tech </a:t>
+            </a:r>
+            <a:r>
+              <a:rPr lang="en-US" dirty="0" smtClean="0"/>
+              <a:t>Stack (Front End)</a:t>
+            </a:r>
+            <a:endParaRPr lang="en-US" dirty="0"/>
+          </a:p>
+        </p:txBody>
+      </p:sp>
+      <p:sp>
+        <p:nvSpPr>
+          <p:cNvPr id="8" name="TextBox 7"/>
+          <p:cNvSpPr txBox="1"/>
+          <p:nvPr/>
+        </p:nvSpPr>
+        <p:spPr>
+          <a:xfrm>
+            <a:off x="4139952" y="1627873"/>
+            <a:ext cx="4068452" cy="1200329"/>
+          </a:xfrm>
+          <a:prstGeom prst="rect">
+            <a:avLst/>
+          </a:prstGeom>
+          <a:noFill/>
+        </p:spPr>
+        <p:txBody>
+          <a:bodyPr wrap="square" rtlCol="0">
+            <a:spAutoFit/>
+          </a:bodyPr>
+          <a:lstStyle/>
+          <a:p>
+            <a:pPr algn="just"/>
+            <a:r>
+              <a:rPr lang="en-US" dirty="0"/>
+              <a:t>HTML5 is a markup language used for structuring and presenting content on the World Wide Web</a:t>
+            </a:r>
+            <a:r>
+              <a:rPr lang="en-US" dirty="0" smtClean="0"/>
+              <a:t>..</a:t>
+            </a:r>
+            <a:r>
+              <a:rPr lang="en-US" dirty="0" smtClean="0"/>
+              <a:t> </a:t>
+            </a:r>
+            <a:r>
+              <a:rPr lang="en-US" dirty="0" smtClean="0"/>
+              <a:t>(Wikipedia, </a:t>
+            </a:r>
+            <a:r>
+              <a:rPr lang="en-US" dirty="0" smtClean="0"/>
+              <a:t>2022)</a:t>
+            </a:r>
+            <a:endParaRPr lang="en-US" dirty="0"/>
+          </a:p>
+        </p:txBody>
+      </p:sp>
+      <p:sp>
+        <p:nvSpPr>
+          <p:cNvPr id="10" name="TextBox 9"/>
+          <p:cNvSpPr txBox="1"/>
+          <p:nvPr/>
+        </p:nvSpPr>
+        <p:spPr>
+          <a:xfrm>
+            <a:off x="1259632" y="4263344"/>
+            <a:ext cx="4464496" cy="1754326"/>
+          </a:xfrm>
+          <a:prstGeom prst="rect">
+            <a:avLst/>
+          </a:prstGeom>
+          <a:noFill/>
+        </p:spPr>
+        <p:txBody>
+          <a:bodyPr wrap="square" rtlCol="0">
+            <a:spAutoFit/>
+          </a:bodyPr>
+          <a:lstStyle/>
+          <a:p>
+            <a:pPr algn="just"/>
+            <a:r>
+              <a:rPr lang="en-US" dirty="0"/>
+              <a:t>CSS is a standard style sheet language used for describing the presentation (i.e. the layout and formatting) of the web </a:t>
+            </a:r>
+            <a:r>
+              <a:rPr lang="en-US" dirty="0" smtClean="0"/>
+              <a:t>pages </a:t>
+            </a:r>
+            <a:r>
+              <a:rPr lang="en-US" dirty="0"/>
+              <a:t>(https://www.tutorialrepublic.com/css-tutorial/)</a:t>
+            </a:r>
+            <a:endParaRPr lang="en-US" dirty="0"/>
+          </a:p>
+        </p:txBody>
+      </p:sp>
+      <p:pic>
+        <p:nvPicPr>
+          <p:cNvPr id="1026" name="Picture 2" descr="http://3.bp.blogspot.com/-otC_y1uZIUM/VQFZRU4CnfI/AAAAAAAAAJY/q-Kg53RocZw/s1600/MetroUI-Apps-HTML-5-icon.png"/>
+          <p:cNvPicPr>
+            <a:picLocks noChangeAspect="1" noChangeArrowheads="1"/>
+          </p:cNvPicPr>
+          <p:nvPr/>
+        </p:nvPicPr>
+        <p:blipFill>
+          <a:blip r:embed="rId2">
+            <a:extLst>
+              <a:ext uri="{28A0092B-C50C-407E-A947-70E740481C1C}">
+                <a14:useLocalDpi xmlns:a14="http://schemas.microsoft.com/office/drawing/2010/main" val="0"/>
+              </a:ext>
+            </a:extLst>
+          </a:blip>
+          <a:srcRect/>
+          <a:stretch>
+            <a:fillRect/>
+          </a:stretch>
+        </p:blipFill>
+        <p:spPr bwMode="auto">
+          <a:xfrm>
+            <a:off x="924937" y="1203376"/>
+            <a:ext cx="2880319" cy="2880320"/>
+          </a:xfrm>
+          <a:prstGeom prst="rect">
+            <a:avLst/>
+          </a:prstGeom>
+          <a:noFill/>
+          <a:extLst>
+            <a:ext uri="{909E8E84-426E-40DD-AFC4-6F175D3DCCD1}">
+              <a14:hiddenFill xmlns:a14="http://schemas.microsoft.com/office/drawing/2010/main">
+                <a:solidFill>
+                  <a:srgbClr val="FFFFFF"/>
+                </a:solidFill>
+              </a14:hiddenFill>
+            </a:ext>
+          </a:extLst>
+        </p:spPr>
+      </p:pic>
+      <p:pic>
+        <p:nvPicPr>
+          <p:cNvPr id="1028" name="Picture 4" descr="https://e7.pngegg.com/pngimages/239/228/png-clipart-html-css3-cascading-style-sheets-logo-markup-language-digital-agency-miscellaneous-blue.png"/>
+          <p:cNvPicPr>
+            <a:picLocks noChangeAspect="1" noChangeArrowheads="1"/>
+          </p:cNvPicPr>
+          <p:nvPr/>
+        </p:nvPicPr>
+        <p:blipFill>
+          <a:blip r:embed="rId3" cstate="print">
+            <a:extLst>
+              <a:ext uri="{28A0092B-C50C-407E-A947-70E740481C1C}">
+                <a14:useLocalDpi xmlns:a14="http://schemas.microsoft.com/office/drawing/2010/main" val="0"/>
+              </a:ext>
+            </a:extLst>
+          </a:blip>
+          <a:srcRect/>
+          <a:stretch>
+            <a:fillRect/>
+          </a:stretch>
+        </p:blipFill>
+        <p:spPr bwMode="auto">
+          <a:xfrm>
+            <a:off x="5972028" y="2828202"/>
+            <a:ext cx="2245571" cy="3600399"/>
+          </a:xfrm>
+          <a:prstGeom prst="rect">
+            <a:avLst/>
+          </a:prstGeom>
+          <a:noFill/>
+          <a:extLst>
+            <a:ext uri="{909E8E84-426E-40DD-AFC4-6F175D3DCCD1}">
+              <a14:hiddenFill xmlns:a14="http://schemas.microsoft.com/office/drawing/2010/main">
+                <a:solidFill>
+                  <a:srgbClr val="FFFFFF"/>
+                </a:solidFill>
+              </a14:hiddenFill>
+            </a:ext>
+          </a:extLst>
+        </p:spPr>
+      </p:pic>
+    </p:spTree>
+    <p:extLst>
+      <p:ext uri="{BB962C8B-B14F-4D97-AF65-F5344CB8AC3E}">
+        <p14:creationId xmlns:p14="http://schemas.microsoft.com/office/powerpoint/2010/main" val="3937619722"/>
+      </p:ext>
+    </p:extLst>
+  </p:cSld>
+  <p:clrMapOvr>
+    <a:masterClrMapping/>
+  </p:clrMapOvr>
+  <p:timing>
+    <p:tnLst>
+      <p:par>
+        <p:cTn id="1" dur="indefinite" restart="never" nodeType="tmRoot"/>
+      </p:par>
+    </p:tnLst>
+  </p:timing>
+</p:sld>
+</file>
+
+<file path=ppt/slides/slide7.xml><?xml version="1.0" encoding="utf-8"?>
+<p:sld xmlns:a="http://schemas.openxmlformats.org/drawingml/2006/main" xmlns:r="http://schemas.openxmlformats.org/officeDocument/2006/relationships" xmlns:p="http://schemas.openxmlformats.org/presentationml/2006/main">
+  <p:cSld>
+    <p:spTree>
+      <p:nvGrpSpPr>
+        <p:cNvPr id="1" name=""/>
+        <p:cNvGrpSpPr/>
+        <p:nvPr/>
+      </p:nvGrpSpPr>
+      <p:grpSpPr>
+        <a:xfrm>
+          <a:off x="0" y="0"/>
+          <a:ext cx="0" cy="0"/>
+          <a:chOff x="0" y="0"/>
+          <a:chExt cx="0" cy="0"/>
+        </a:xfrm>
+      </p:grpSpPr>
+      <p:sp>
+        <p:nvSpPr>
+          <p:cNvPr id="2" name="Title 1"/>
+          <p:cNvSpPr>
+            <a:spLocks noGrp="1"/>
+          </p:cNvSpPr>
+          <p:nvPr>
+            <p:ph type="title"/>
+          </p:nvPr>
+        </p:nvSpPr>
+        <p:spPr/>
+        <p:txBody>
+          <a:bodyPr/>
+          <a:lstStyle/>
+          <a:p>
+            <a:endParaRPr lang="en-US"/>
+          </a:p>
+        </p:txBody>
+      </p:sp>
+      <p:sp>
+        <p:nvSpPr>
+          <p:cNvPr id="3" name="Content Placeholder 2"/>
+          <p:cNvSpPr>
+            <a:spLocks noGrp="1"/>
+          </p:cNvSpPr>
+          <p:nvPr>
+            <p:ph idx="1"/>
+          </p:nvPr>
+        </p:nvSpPr>
+        <p:spPr/>
+        <p:txBody>
+          <a:bodyPr/>
+          <a:lstStyle/>
+          <a:p>
+            <a:endParaRPr lang="en-US"/>
+          </a:p>
+        </p:txBody>
+      </p:sp>
+      <p:pic>
+        <p:nvPicPr>
+          <p:cNvPr id="2050" name="Picture 2" descr="https://getbootstrap.com/docs/5.1/assets/brand/bootstrap-social-logo.png"/>
+          <p:cNvPicPr>
+            <a:picLocks noChangeAspect="1" noChangeArrowheads="1"/>
+          </p:cNvPicPr>
+          <p:nvPr/>
+        </p:nvPicPr>
+        <p:blipFill>
+          <a:blip r:embed="rId2">
+            <a:extLst>
+              <a:ext uri="{28A0092B-C50C-407E-A947-70E740481C1C}">
+                <a14:useLocalDpi xmlns:a14="http://schemas.microsoft.com/office/drawing/2010/main" val="0"/>
+              </a:ext>
+            </a:extLst>
+          </a:blip>
+          <a:srcRect/>
+          <a:stretch>
+            <a:fillRect/>
+          </a:stretch>
+        </p:blipFill>
+        <p:spPr bwMode="auto">
+          <a:xfrm>
+            <a:off x="683568" y="1988840"/>
+            <a:ext cx="3240360" cy="3240360"/>
+          </a:xfrm>
+          <a:prstGeom prst="rect">
+            <a:avLst/>
+          </a:prstGeom>
+          <a:noFill/>
+          <a:extLst>
+            <a:ext uri="{909E8E84-426E-40DD-AFC4-6F175D3DCCD1}">
+              <a14:hiddenFill xmlns:a14="http://schemas.microsoft.com/office/drawing/2010/main">
+                <a:solidFill>
+                  <a:srgbClr val="FFFFFF"/>
+                </a:solidFill>
+              </a14:hiddenFill>
+            </a:ext>
+          </a:extLst>
+        </p:spPr>
+      </p:pic>
+      <p:sp>
+        <p:nvSpPr>
+          <p:cNvPr id="5" name="TextBox 4"/>
+          <p:cNvSpPr txBox="1"/>
+          <p:nvPr/>
+        </p:nvSpPr>
+        <p:spPr>
+          <a:xfrm>
+            <a:off x="4155920" y="3008855"/>
+            <a:ext cx="4068452" cy="1200329"/>
+          </a:xfrm>
+          <a:prstGeom prst="rect">
+            <a:avLst/>
+          </a:prstGeom>
+          <a:noFill/>
+        </p:spPr>
+        <p:txBody>
+          <a:bodyPr wrap="square" rtlCol="0">
+            <a:spAutoFit/>
+          </a:bodyPr>
+          <a:lstStyle/>
+          <a:p>
+            <a:pPr algn="just"/>
+            <a:r>
+              <a:rPr lang="en-US" sz="2400" dirty="0" smtClean="0"/>
+              <a:t>Bootstrap 5 </a:t>
+            </a:r>
+            <a:r>
+              <a:rPr lang="en-US" sz="2400" dirty="0"/>
+              <a:t>is a </a:t>
+            </a:r>
+            <a:r>
+              <a:rPr lang="en-US" sz="2400" dirty="0" smtClean="0"/>
+              <a:t>open source framework for the visual design of a website</a:t>
+            </a:r>
+            <a:endParaRPr lang="en-US" sz="2400" dirty="0"/>
+          </a:p>
+        </p:txBody>
+      </p:sp>
+    </p:spTree>
+    <p:extLst>
+      <p:ext uri="{BB962C8B-B14F-4D97-AF65-F5344CB8AC3E}">
+        <p14:creationId xmlns:p14="http://schemas.microsoft.com/office/powerpoint/2010/main" val="3695492082"/>
+      </p:ext>
+    </p:extLst>
+  </p:cSld>
+  <p:clrMapOvr>
+    <a:masterClrMapping/>
+  </p:clrMapOvr>
+</p:sld>
+</file>
+
+<file path=ppt/slides/slide8.xml><?xml version="1.0" encoding="utf-8"?>
 <p:sld xmlns:a="http://schemas.openxmlformats.org/drawingml/2006/main" xmlns:r="http://schemas.openxmlformats.org/officeDocument/2006/relationships" xmlns:p="http://schemas.openxmlformats.org/presentationml/2006/main">
   <p:cSld>
     <p:spTree>
@@ -15284,7 +16144,7 @@
 </p:sld>
 </file>
 
-<file path=ppt/slides/slide7.xml><?xml version="1.0" encoding="utf-8"?>
+<file path=ppt/slides/slide9.xml><?xml version="1.0" encoding="utf-8"?>
 <p:sld xmlns:a="http://schemas.openxmlformats.org/drawingml/2006/main" xmlns:r="http://schemas.openxmlformats.org/officeDocument/2006/relationships" xmlns:p="http://schemas.openxmlformats.org/presentationml/2006/main">
   <p:cSld>
     <p:spTree>
@@ -15430,299 +16290,6 @@
       </p:par>
     </p:tnLst>
   </p:timing>
-</p:sld>
-</file>
-
-<file path=ppt/slides/slide8.xml><?xml version="1.0" encoding="utf-8"?>
-<p:sld xmlns:a="http://schemas.openxmlformats.org/drawingml/2006/main" xmlns:r="http://schemas.openxmlformats.org/officeDocument/2006/relationships" xmlns:p="http://schemas.openxmlformats.org/presentationml/2006/main">
-  <p:cSld>
-    <p:spTree>
-      <p:nvGrpSpPr>
-        <p:cNvPr id="1" name=""/>
-        <p:cNvGrpSpPr/>
-        <p:nvPr/>
-      </p:nvGrpSpPr>
-      <p:grpSpPr>
-        <a:xfrm>
-          <a:off x="0" y="0"/>
-          <a:ext cx="0" cy="0"/>
-          <a:chOff x="0" y="0"/>
-          <a:chExt cx="0" cy="0"/>
-        </a:xfrm>
-      </p:grpSpPr>
-      <p:sp>
-        <p:nvSpPr>
-          <p:cNvPr id="3" name="Content Placeholder 2"/>
-          <p:cNvSpPr>
-            <a:spLocks noGrp="1"/>
-          </p:cNvSpPr>
-          <p:nvPr>
-            <p:ph idx="1"/>
-          </p:nvPr>
-        </p:nvSpPr>
-        <p:spPr/>
-        <p:txBody>
-          <a:bodyPr/>
-          <a:lstStyle/>
-          <a:p>
-            <a:endParaRPr lang="en-US"/>
-          </a:p>
-        </p:txBody>
-      </p:sp>
-      <p:sp>
-        <p:nvSpPr>
-          <p:cNvPr id="4" name="Title 1"/>
-          <p:cNvSpPr>
-            <a:spLocks noGrp="1"/>
-          </p:cNvSpPr>
-          <p:nvPr>
-            <p:ph type="title"/>
-          </p:nvPr>
-        </p:nvSpPr>
-        <p:spPr>
-          <a:xfrm>
-            <a:off x="1043608" y="692696"/>
-            <a:ext cx="7024744" cy="720080"/>
-          </a:xfrm>
-        </p:spPr>
-        <p:txBody>
-          <a:bodyPr/>
-          <a:lstStyle/>
-          <a:p>
-            <a:pPr algn="ctr"/>
-            <a:r>
-              <a:rPr lang="en-US" dirty="0" smtClean="0"/>
-              <a:t>Recipe CRUD Flowchart</a:t>
-            </a:r>
-            <a:endParaRPr lang="en-US" dirty="0"/>
-          </a:p>
-        </p:txBody>
-      </p:sp>
-      <p:pic>
-        <p:nvPicPr>
-          <p:cNvPr id="4098" name="Picture 2"/>
-          <p:cNvPicPr>
-            <a:picLocks noChangeAspect="1" noChangeArrowheads="1"/>
-          </p:cNvPicPr>
-          <p:nvPr/>
-        </p:nvPicPr>
-        <p:blipFill>
-          <a:blip r:embed="rId2" cstate="print">
-            <a:extLst>
-              <a:ext uri="{28A0092B-C50C-407E-A947-70E740481C1C}">
-                <a14:useLocalDpi xmlns:a14="http://schemas.microsoft.com/office/drawing/2010/main" val="0"/>
-              </a:ext>
-            </a:extLst>
-          </a:blip>
-          <a:srcRect/>
-          <a:stretch>
-            <a:fillRect/>
-          </a:stretch>
-        </p:blipFill>
-        <p:spPr bwMode="auto">
-          <a:xfrm>
-            <a:off x="899592" y="1467624"/>
-            <a:ext cx="7175973" cy="5256584"/>
-          </a:xfrm>
-          <a:prstGeom prst="rect">
-            <a:avLst/>
-          </a:prstGeom>
-          <a:noFill/>
-          <a:ln>
-            <a:noFill/>
-          </a:ln>
-          <a:effectLst/>
-          <a:extLst>
-            <a:ext uri="{909E8E84-426E-40DD-AFC4-6F175D3DCCD1}">
-              <a14:hiddenFill xmlns:a14="http://schemas.microsoft.com/office/drawing/2010/main">
-                <a:solidFill>
-                  <a:schemeClr val="accent1"/>
-                </a:solidFill>
-              </a14:hiddenFill>
-            </a:ext>
-            <a:ext uri="{91240B29-F687-4F45-9708-019B960494DF}">
-              <a14:hiddenLine xmlns:a14="http://schemas.microsoft.com/office/drawing/2010/main" w="9525">
-                <a:solidFill>
-                  <a:schemeClr val="tx1"/>
-                </a:solidFill>
-                <a:miter lim="800000"/>
-                <a:headEnd/>
-                <a:tailEnd/>
-              </a14:hiddenLine>
-            </a:ext>
-            <a:ext uri="{AF507438-7753-43E0-B8FC-AC1667EBCBE1}">
-              <a14:hiddenEffects xmlns:a14="http://schemas.microsoft.com/office/drawing/2010/main">
-                <a:effectLst>
-                  <a:outerShdw dist="35921" dir="2700000" algn="ctr" rotWithShape="0">
-                    <a:schemeClr val="bg2"/>
-                  </a:outerShdw>
-                </a:effectLst>
-              </a14:hiddenEffects>
-            </a:ext>
-          </a:extLst>
-        </p:spPr>
-      </p:pic>
-    </p:spTree>
-    <p:extLst>
-      <p:ext uri="{BB962C8B-B14F-4D97-AF65-F5344CB8AC3E}">
-        <p14:creationId xmlns:p14="http://schemas.microsoft.com/office/powerpoint/2010/main" val="1280948400"/>
-      </p:ext>
-    </p:extLst>
-  </p:cSld>
-  <p:clrMapOvr>
-    <a:masterClrMapping/>
-  </p:clrMapOvr>
-  <p:timing>
-    <p:tnLst>
-      <p:par>
-        <p:cTn id="1" dur="indefinite" restart="never" nodeType="tmRoot"/>
-      </p:par>
-    </p:tnLst>
-  </p:timing>
-</p:sld>
-</file>
-
-<file path=ppt/slides/slide9.xml><?xml version="1.0" encoding="utf-8"?>
-<p:sld xmlns:a="http://schemas.openxmlformats.org/drawingml/2006/main" xmlns:r="http://schemas.openxmlformats.org/officeDocument/2006/relationships" xmlns:p="http://schemas.openxmlformats.org/presentationml/2006/main">
-  <p:cSld>
-    <p:spTree>
-      <p:nvGrpSpPr>
-        <p:cNvPr id="1" name=""/>
-        <p:cNvGrpSpPr/>
-        <p:nvPr/>
-      </p:nvGrpSpPr>
-      <p:grpSpPr>
-        <a:xfrm>
-          <a:off x="0" y="0"/>
-          <a:ext cx="0" cy="0"/>
-          <a:chOff x="0" y="0"/>
-          <a:chExt cx="0" cy="0"/>
-        </a:xfrm>
-      </p:grpSpPr>
-      <p:sp>
-        <p:nvSpPr>
-          <p:cNvPr id="3" name="Content Placeholder 2"/>
-          <p:cNvSpPr>
-            <a:spLocks noGrp="1"/>
-          </p:cNvSpPr>
-          <p:nvPr>
-            <p:ph idx="1"/>
-          </p:nvPr>
-        </p:nvSpPr>
-        <p:spPr/>
-        <p:txBody>
-          <a:bodyPr/>
-          <a:lstStyle/>
-          <a:p>
-            <a:endParaRPr lang="en-US" dirty="0"/>
-          </a:p>
-        </p:txBody>
-      </p:sp>
-      <p:sp>
-        <p:nvSpPr>
-          <p:cNvPr id="4" name="Title 1"/>
-          <p:cNvSpPr>
-            <a:spLocks noGrp="1"/>
-          </p:cNvSpPr>
-          <p:nvPr>
-            <p:ph type="title"/>
-          </p:nvPr>
-        </p:nvSpPr>
-        <p:spPr>
-          <a:xfrm>
-            <a:off x="1043608" y="692696"/>
-            <a:ext cx="7024744" cy="720080"/>
-          </a:xfrm>
-        </p:spPr>
-        <p:txBody>
-          <a:bodyPr>
-            <a:normAutofit fontScale="90000"/>
-          </a:bodyPr>
-          <a:lstStyle/>
-          <a:p>
-            <a:pPr algn="ctr"/>
-            <a:r>
-              <a:rPr lang="en-US" dirty="0" smtClean="0"/>
-              <a:t>Recipe Comment CRUD Flowchart</a:t>
-            </a:r>
-            <a:endParaRPr lang="en-US" dirty="0"/>
-          </a:p>
-        </p:txBody>
-      </p:sp>
-      <p:pic>
-        <p:nvPicPr>
-          <p:cNvPr id="5122" name="Picture 2"/>
-          <p:cNvPicPr>
-            <a:picLocks noChangeAspect="1" noChangeArrowheads="1"/>
-          </p:cNvPicPr>
-          <p:nvPr/>
-        </p:nvPicPr>
-        <p:blipFill>
-          <a:blip r:embed="rId2">
-            <a:extLst>
-              <a:ext uri="{28A0092B-C50C-407E-A947-70E740481C1C}">
-                <a14:useLocalDpi xmlns:a14="http://schemas.microsoft.com/office/drawing/2010/main" val="0"/>
-              </a:ext>
-            </a:extLst>
-          </a:blip>
-          <a:srcRect/>
-          <a:stretch>
-            <a:fillRect/>
-          </a:stretch>
-        </p:blipFill>
-        <p:spPr bwMode="auto">
-          <a:xfrm>
-            <a:off x="226384" y="1605936"/>
-            <a:ext cx="8681368" cy="4617095"/>
-          </a:xfrm>
-          <a:prstGeom prst="rect">
-            <a:avLst/>
-          </a:prstGeom>
-          <a:noFill/>
-          <a:ln>
-            <a:noFill/>
-          </a:ln>
-          <a:effectLst/>
-          <a:extLst>
-            <a:ext uri="{909E8E84-426E-40DD-AFC4-6F175D3DCCD1}">
-              <a14:hiddenFill xmlns:a14="http://schemas.microsoft.com/office/drawing/2010/main">
-                <a:solidFill>
-                  <a:schemeClr val="accent1"/>
-                </a:solidFill>
-              </a14:hiddenFill>
-            </a:ext>
-            <a:ext uri="{91240B29-F687-4F45-9708-019B960494DF}">
-              <a14:hiddenLine xmlns:a14="http://schemas.microsoft.com/office/drawing/2010/main" w="9525">
-                <a:solidFill>
-                  <a:schemeClr val="tx1"/>
-                </a:solidFill>
-                <a:miter lim="800000"/>
-                <a:headEnd/>
-                <a:tailEnd/>
-              </a14:hiddenLine>
-            </a:ext>
-            <a:ext uri="{AF507438-7753-43E0-B8FC-AC1667EBCBE1}">
-              <a14:hiddenEffects xmlns:a14="http://schemas.microsoft.com/office/drawing/2010/main">
-                <a:effectLst>
-                  <a:outerShdw dist="35921" dir="2700000" algn="ctr" rotWithShape="0">
-                    <a:schemeClr val="bg2"/>
-                  </a:outerShdw>
-                </a:effectLst>
-              </a14:hiddenEffects>
-            </a:ext>
-          </a:extLst>
-        </p:spPr>
-      </p:pic>
-    </p:spTree>
-    <p:extLst>
-      <p:ext uri="{BB962C8B-B14F-4D97-AF65-F5344CB8AC3E}">
-        <p14:creationId xmlns:p14="http://schemas.microsoft.com/office/powerpoint/2010/main" val="3900780855"/>
-      </p:ext>
-    </p:extLst>
-  </p:cSld>
-  <p:clrMapOvr>
-    <a:masterClrMapping/>
-  </p:clrMapOvr>
 </p:sld>
 </file>
 

</xml_diff>